<commit_message>
deleted unknown folder, and added animation to the presentation
</commit_message>
<xml_diff>
--- a/Documentation/DE2_Term_Presentation.pptx
+++ b/Documentation/DE2_Term_Presentation.pptx
@@ -132,201 +132,9 @@
 <p1510:revInfo xmlns:a="http://schemas.openxmlformats.org/drawingml/2006/main" xmlns:r="http://schemas.openxmlformats.org/officeDocument/2006/relationships" xmlns:p1510="http://schemas.microsoft.com/office/powerpoint/2015/10/main">
   <p1510:revLst>
     <p1510:client id="{710AC600-54DC-B942-8EBA-223E84510A54}" v="22" dt="2020-12-11T16:30:13.994"/>
+    <p1510:client id="{85DDA4A5-0E99-B841-AC5A-9CA06328E63C}" v="13" dt="2020-12-11T19:06:27.863"/>
   </p1510:revLst>
 </p1510:revInfo>
-</file>
-
-<file path=ppt/changesInfos/changesInfo1.xml><?xml version="1.0" encoding="utf-8"?>
-<pc:chgInfo xmlns:a="http://schemas.openxmlformats.org/drawingml/2006/main" xmlns:r="http://schemas.openxmlformats.org/officeDocument/2006/relationships" xmlns:ac="http://schemas.microsoft.com/office/drawing/2013/main/command" xmlns:pc="http://schemas.microsoft.com/office/powerpoint/2013/main/command">
-  <pc:docChgLst>
-    <pc:chgData name="Terez Szabo" userId="42e7e467-1161-451a-9926-179cfa22533b" providerId="ADAL" clId="{710AC600-54DC-B942-8EBA-223E84510A54}"/>
-    <pc:docChg chg="custSel mod addSld delSld modSld">
-      <pc:chgData name="Terez Szabo" userId="42e7e467-1161-451a-9926-179cfa22533b" providerId="ADAL" clId="{710AC600-54DC-B942-8EBA-223E84510A54}" dt="2020-12-11T16:31:02.763" v="82" actId="26606"/>
-      <pc:docMkLst>
-        <pc:docMk/>
-      </pc:docMkLst>
-      <pc:sldChg chg="modSp del mod">
-        <pc:chgData name="Terez Szabo" userId="42e7e467-1161-451a-9926-179cfa22533b" providerId="ADAL" clId="{710AC600-54DC-B942-8EBA-223E84510A54}" dt="2020-12-11T16:30:19.177" v="51" actId="2696"/>
-        <pc:sldMkLst>
-          <pc:docMk/>
-          <pc:sldMk cId="1311002320" sldId="262"/>
-        </pc:sldMkLst>
-        <pc:spChg chg="mod">
-          <ac:chgData name="Terez Szabo" userId="42e7e467-1161-451a-9926-179cfa22533b" providerId="ADAL" clId="{710AC600-54DC-B942-8EBA-223E84510A54}" dt="2020-12-11T16:30:06.742" v="50" actId="21"/>
-          <ac:spMkLst>
-            <pc:docMk/>
-            <pc:sldMk cId="1311002320" sldId="262"/>
-            <ac:spMk id="3" creationId="{79A9425A-062D-D545-A18A-44226D2EBAD3}"/>
-          </ac:spMkLst>
-        </pc:spChg>
-      </pc:sldChg>
-      <pc:sldChg chg="del">
-        <pc:chgData name="Terez Szabo" userId="42e7e467-1161-451a-9926-179cfa22533b" providerId="ADAL" clId="{710AC600-54DC-B942-8EBA-223E84510A54}" dt="2020-12-11T16:29:59.433" v="49" actId="2696"/>
-        <pc:sldMkLst>
-          <pc:docMk/>
-          <pc:sldMk cId="103008590" sldId="263"/>
-        </pc:sldMkLst>
-      </pc:sldChg>
-      <pc:sldChg chg="addSp modSp mod">
-        <pc:chgData name="Terez Szabo" userId="42e7e467-1161-451a-9926-179cfa22533b" providerId="ADAL" clId="{710AC600-54DC-B942-8EBA-223E84510A54}" dt="2020-12-11T16:25:18.471" v="10" actId="14100"/>
-        <pc:sldMkLst>
-          <pc:docMk/>
-          <pc:sldMk cId="2458617161" sldId="267"/>
-        </pc:sldMkLst>
-        <pc:picChg chg="add mod">
-          <ac:chgData name="Terez Szabo" userId="42e7e467-1161-451a-9926-179cfa22533b" providerId="ADAL" clId="{710AC600-54DC-B942-8EBA-223E84510A54}" dt="2020-12-11T16:25:18.471" v="10" actId="14100"/>
-          <ac:picMkLst>
-            <pc:docMk/>
-            <pc:sldMk cId="2458617161" sldId="267"/>
-            <ac:picMk id="3" creationId="{282910C1-8698-8444-99A4-517451E2B95A}"/>
-          </ac:picMkLst>
-        </pc:picChg>
-        <pc:picChg chg="mod">
-          <ac:chgData name="Terez Szabo" userId="42e7e467-1161-451a-9926-179cfa22533b" providerId="ADAL" clId="{710AC600-54DC-B942-8EBA-223E84510A54}" dt="2020-12-11T16:25:14.968" v="9" actId="14100"/>
-          <ac:picMkLst>
-            <pc:docMk/>
-            <pc:sldMk cId="2458617161" sldId="267"/>
-            <ac:picMk id="10" creationId="{A00C5D16-95A8-D843-AA2E-5BDB4CFB0C55}"/>
-          </ac:picMkLst>
-        </pc:picChg>
-      </pc:sldChg>
-      <pc:sldChg chg="addSp delSp modSp mod">
-        <pc:chgData name="Terez Szabo" userId="42e7e467-1161-451a-9926-179cfa22533b" providerId="ADAL" clId="{710AC600-54DC-B942-8EBA-223E84510A54}" dt="2020-12-11T16:29:50.288" v="48" actId="14100"/>
-        <pc:sldMkLst>
-          <pc:docMk/>
-          <pc:sldMk cId="1974929923" sldId="269"/>
-        </pc:sldMkLst>
-        <pc:spChg chg="mod">
-          <ac:chgData name="Terez Szabo" userId="42e7e467-1161-451a-9926-179cfa22533b" providerId="ADAL" clId="{710AC600-54DC-B942-8EBA-223E84510A54}" dt="2020-12-11T16:29:43.529" v="46" actId="14100"/>
-          <ac:spMkLst>
-            <pc:docMk/>
-            <pc:sldMk cId="1974929923" sldId="269"/>
-            <ac:spMk id="2" creationId="{5D509755-BF9E-4045-9B1F-A4B620116FAA}"/>
-          </ac:spMkLst>
-        </pc:spChg>
-        <pc:spChg chg="add del mod">
-          <ac:chgData name="Terez Szabo" userId="42e7e467-1161-451a-9926-179cfa22533b" providerId="ADAL" clId="{710AC600-54DC-B942-8EBA-223E84510A54}" dt="2020-12-11T16:29:39.191" v="45" actId="478"/>
-          <ac:spMkLst>
-            <pc:docMk/>
-            <pc:sldMk cId="1974929923" sldId="269"/>
-            <ac:spMk id="6" creationId="{8A25F9FF-78F3-6246-8584-0CA9C57FAFF4}"/>
-          </ac:spMkLst>
-        </pc:spChg>
-        <pc:spChg chg="del">
-          <ac:chgData name="Terez Szabo" userId="42e7e467-1161-451a-9926-179cfa22533b" providerId="ADAL" clId="{710AC600-54DC-B942-8EBA-223E84510A54}" dt="2020-12-11T16:25:35.342" v="11" actId="931"/>
-          <ac:spMkLst>
-            <pc:docMk/>
-            <pc:sldMk cId="1974929923" sldId="269"/>
-            <ac:spMk id="7" creationId="{46C7DCB7-F220-E740-848D-A1693EBB584E}"/>
-          </ac:spMkLst>
-        </pc:spChg>
-        <pc:picChg chg="add mod">
-          <ac:chgData name="Terez Szabo" userId="42e7e467-1161-451a-9926-179cfa22533b" providerId="ADAL" clId="{710AC600-54DC-B942-8EBA-223E84510A54}" dt="2020-12-11T16:29:50.288" v="48" actId="14100"/>
-          <ac:picMkLst>
-            <pc:docMk/>
-            <pc:sldMk cId="1974929923" sldId="269"/>
-            <ac:picMk id="4" creationId="{0295FF91-841B-064B-AD8C-1D4D0F60FCF6}"/>
-          </ac:picMkLst>
-        </pc:picChg>
-      </pc:sldChg>
-      <pc:sldChg chg="addSp delSp modSp new mod setBg">
-        <pc:chgData name="Terez Szabo" userId="42e7e467-1161-451a-9926-179cfa22533b" providerId="ADAL" clId="{710AC600-54DC-B942-8EBA-223E84510A54}" dt="2020-12-11T16:31:02.763" v="82" actId="26606"/>
-        <pc:sldMkLst>
-          <pc:docMk/>
-          <pc:sldMk cId="4063716037" sldId="273"/>
-        </pc:sldMkLst>
-        <pc:spChg chg="mod">
-          <ac:chgData name="Terez Szabo" userId="42e7e467-1161-451a-9926-179cfa22533b" providerId="ADAL" clId="{710AC600-54DC-B942-8EBA-223E84510A54}" dt="2020-12-11T16:31:02.763" v="82" actId="26606"/>
-          <ac:spMkLst>
-            <pc:docMk/>
-            <pc:sldMk cId="4063716037" sldId="273"/>
-            <ac:spMk id="2" creationId="{4D2BA7B0-75C8-A24B-8ED1-93421206F4FB}"/>
-          </ac:spMkLst>
-        </pc:spChg>
-        <pc:spChg chg="del">
-          <ac:chgData name="Terez Szabo" userId="42e7e467-1161-451a-9926-179cfa22533b" providerId="ADAL" clId="{710AC600-54DC-B942-8EBA-223E84510A54}" dt="2020-12-11T16:30:42.242" v="53" actId="26606"/>
-          <ac:spMkLst>
-            <pc:docMk/>
-            <pc:sldMk cId="4063716037" sldId="273"/>
-            <ac:spMk id="3" creationId="{84AEEA6C-2031-7248-B74C-ACD946BE9C32}"/>
-          </ac:spMkLst>
-        </pc:spChg>
-        <pc:spChg chg="add del">
-          <ac:chgData name="Terez Szabo" userId="42e7e467-1161-451a-9926-179cfa22533b" providerId="ADAL" clId="{710AC600-54DC-B942-8EBA-223E84510A54}" dt="2020-12-11T16:31:02.763" v="82" actId="26606"/>
-          <ac:spMkLst>
-            <pc:docMk/>
-            <pc:sldMk cId="4063716037" sldId="273"/>
-            <ac:spMk id="16" creationId="{3011B0B3-5679-4759-90B8-3B908C4CBD21}"/>
-          </ac:spMkLst>
-        </pc:spChg>
-        <pc:spChg chg="add">
-          <ac:chgData name="Terez Szabo" userId="42e7e467-1161-451a-9926-179cfa22533b" providerId="ADAL" clId="{710AC600-54DC-B942-8EBA-223E84510A54}" dt="2020-12-11T16:31:02.763" v="82" actId="26606"/>
-          <ac:spMkLst>
-            <pc:docMk/>
-            <pc:sldMk cId="4063716037" sldId="273"/>
-            <ac:spMk id="32" creationId="{CA5B2A81-2C8E-4963-AFD4-E539D168B475}"/>
-          </ac:spMkLst>
-        </pc:spChg>
-        <pc:grpChg chg="add del">
-          <ac:chgData name="Terez Szabo" userId="42e7e467-1161-451a-9926-179cfa22533b" providerId="ADAL" clId="{710AC600-54DC-B942-8EBA-223E84510A54}" dt="2020-12-11T16:31:02.763" v="82" actId="26606"/>
-          <ac:grpSpMkLst>
-            <pc:docMk/>
-            <pc:sldMk cId="4063716037" sldId="273"/>
-            <ac:grpSpMk id="10" creationId="{F982E0B2-AA9C-441C-A08E-A9DF9CF12116}"/>
-          </ac:grpSpMkLst>
-        </pc:grpChg>
-        <pc:grpChg chg="add">
-          <ac:chgData name="Terez Szabo" userId="42e7e467-1161-451a-9926-179cfa22533b" providerId="ADAL" clId="{710AC600-54DC-B942-8EBA-223E84510A54}" dt="2020-12-11T16:31:02.763" v="82" actId="26606"/>
-          <ac:grpSpMkLst>
-            <pc:docMk/>
-            <pc:sldMk cId="4063716037" sldId="273"/>
-            <ac:grpSpMk id="26" creationId="{F982E0B2-AA9C-441C-A08E-A9DF9CF12116}"/>
-          </ac:grpSpMkLst>
-        </pc:grpChg>
-        <pc:picChg chg="add">
-          <ac:chgData name="Terez Szabo" userId="42e7e467-1161-451a-9926-179cfa22533b" providerId="ADAL" clId="{710AC600-54DC-B942-8EBA-223E84510A54}" dt="2020-12-11T16:31:02.763" v="82" actId="26606"/>
-          <ac:picMkLst>
-            <pc:docMk/>
-            <pc:sldMk cId="4063716037" sldId="273"/>
-            <ac:picMk id="20" creationId="{28141A80-C3AD-4429-A37F-C38271D461F5}"/>
-          </ac:picMkLst>
-        </pc:picChg>
-        <pc:cxnChg chg="add del">
-          <ac:chgData name="Terez Szabo" userId="42e7e467-1161-451a-9926-179cfa22533b" providerId="ADAL" clId="{710AC600-54DC-B942-8EBA-223E84510A54}" dt="2020-12-11T16:31:02.763" v="82" actId="26606"/>
-          <ac:cxnSpMkLst>
-            <pc:docMk/>
-            <pc:sldMk cId="4063716037" sldId="273"/>
-            <ac:cxnSpMk id="8" creationId="{701C0CAB-6A03-4C6A-9FAA-219847753628}"/>
-          </ac:cxnSpMkLst>
-        </pc:cxnChg>
-        <pc:cxnChg chg="add del">
-          <ac:chgData name="Terez Szabo" userId="42e7e467-1161-451a-9926-179cfa22533b" providerId="ADAL" clId="{710AC600-54DC-B942-8EBA-223E84510A54}" dt="2020-12-11T16:31:02.763" v="82" actId="26606"/>
-          <ac:cxnSpMkLst>
-            <pc:docMk/>
-            <pc:sldMk cId="4063716037" sldId="273"/>
-            <ac:cxnSpMk id="18" creationId="{32E97E5C-7A5F-424E-AAE4-654396E90799}"/>
-          </ac:cxnSpMkLst>
-        </pc:cxnChg>
-        <pc:cxnChg chg="add">
-          <ac:chgData name="Terez Szabo" userId="42e7e467-1161-451a-9926-179cfa22533b" providerId="ADAL" clId="{710AC600-54DC-B942-8EBA-223E84510A54}" dt="2020-12-11T16:31:02.763" v="82" actId="26606"/>
-          <ac:cxnSpMkLst>
-            <pc:docMk/>
-            <pc:sldMk cId="4063716037" sldId="273"/>
-            <ac:cxnSpMk id="24" creationId="{701C0CAB-6A03-4C6A-9FAA-219847753628}"/>
-          </ac:cxnSpMkLst>
-        </pc:cxnChg>
-        <pc:cxnChg chg="add">
-          <ac:chgData name="Terez Szabo" userId="42e7e467-1161-451a-9926-179cfa22533b" providerId="ADAL" clId="{710AC600-54DC-B942-8EBA-223E84510A54}" dt="2020-12-11T16:31:02.763" v="82" actId="26606"/>
-          <ac:cxnSpMkLst>
-            <pc:docMk/>
-            <pc:sldMk cId="4063716037" sldId="273"/>
-            <ac:cxnSpMk id="34" creationId="{9E7C23BC-DAA6-40E1-8166-B8C4439D1430}"/>
-          </ac:cxnSpMkLst>
-        </pc:cxnChg>
-      </pc:sldChg>
-    </pc:docChg>
-  </pc:docChgLst>
-</pc:chgInfo>
 </file>
 
 <file path=ppt/notesMasters/notesMaster1.xml><?xml version="1.0" encoding="utf-8"?>
@@ -891,6 +699,29 @@
           <a:bodyPr/>
           <a:lstStyle/>
           <a:p>
+            <a:pPr marL="0" marR="0" lvl="0" indent="0" algn="l" defTabSz="914400" rtl="0" eaLnBrk="1" fontAlgn="auto" latinLnBrk="0" hangingPunct="1">
+              <a:lnSpc>
+                <a:spcPct val="100000"/>
+              </a:lnSpc>
+              <a:spcBef>
+                <a:spcPts val="0"/>
+              </a:spcBef>
+              <a:spcAft>
+                <a:spcPts val="0"/>
+              </a:spcAft>
+              <a:buClrTx/>
+              <a:buSzTx/>
+              <a:buFontTx/>
+              <a:buNone/>
+              <a:tabLst/>
+              <a:defRPr/>
+            </a:pPr>
+            <a:r>
+              <a:rPr lang="en-US" sz="1200" dirty="0"/>
+              <a:t>Our data flow is efficient because it gets all data with only 1 API request / WDI</a:t>
+            </a:r>
+          </a:p>
+          <a:p>
             <a:endParaRPr lang="en-CH" dirty="0"/>
           </a:p>
         </p:txBody>
@@ -912,7 +743,7 @@
           <a:p>
             <a:fld id="{E6E8B6E9-C291-3B4B-AE9B-9D2ED4D32F18}" type="slidenum">
               <a:rPr lang="en-CH" smtClean="0"/>
-              <a:t>8</a:t>
+              <a:t>5</a:t>
             </a:fld>
             <a:endParaRPr lang="en-CH"/>
           </a:p>
@@ -921,7 +752,7 @@
     </p:spTree>
     <p:extLst>
       <p:ext uri="{BB962C8B-B14F-4D97-AF65-F5344CB8AC3E}">
-        <p14:creationId xmlns:p14="http://schemas.microsoft.com/office/powerpoint/2010/main" val="4252713143"/>
+        <p14:creationId xmlns:p14="http://schemas.microsoft.com/office/powerpoint/2010/main" val="2327397214"/>
       </p:ext>
     </p:extLst>
   </p:cSld>
@@ -975,29 +806,6 @@
           <a:bodyPr/>
           <a:lstStyle/>
           <a:p>
-            <a:r>
-              <a:rPr lang="en-CH" sz="1100" dirty="0"/>
-              <a:t>Some of the variables had a division by gender</a:t>
-            </a:r>
-          </a:p>
-          <a:p>
-            <a:r>
-              <a:rPr lang="en-CH" sz="1100" dirty="0"/>
-              <a:t>Smoking has no correlation to number of suicides</a:t>
-            </a:r>
-          </a:p>
-          <a:p>
-            <a:pPr lvl="2"/>
-            <a:r>
-              <a:rPr lang="en-CH" sz="1100" dirty="0"/>
-              <a:t>Average smokers larger tandancy to commit suicid</a:t>
-            </a:r>
-            <a:r>
-              <a:rPr lang="fr-BE" sz="1100" dirty="0"/>
-              <a:t>e</a:t>
-            </a:r>
-          </a:p>
-          <a:p>
             <a:endParaRPr lang="en-CH" dirty="0"/>
           </a:p>
         </p:txBody>
@@ -1019,7 +827,7 @@
           <a:p>
             <a:fld id="{E6E8B6E9-C291-3B4B-AE9B-9D2ED4D32F18}" type="slidenum">
               <a:rPr lang="en-CH" smtClean="0"/>
-              <a:t>9</a:t>
+              <a:t>8</a:t>
             </a:fld>
             <a:endParaRPr lang="en-CH"/>
           </a:p>
@@ -1028,7 +836,7 @@
     </p:spTree>
     <p:extLst>
       <p:ext uri="{BB962C8B-B14F-4D97-AF65-F5344CB8AC3E}">
-        <p14:creationId xmlns:p14="http://schemas.microsoft.com/office/powerpoint/2010/main" val="1996060125"/>
+        <p14:creationId xmlns:p14="http://schemas.microsoft.com/office/powerpoint/2010/main" val="4252713143"/>
       </p:ext>
     </p:extLst>
   </p:cSld>
@@ -1084,7 +892,24 @@
           <a:p>
             <a:r>
               <a:rPr lang="en-CH" sz="1100" dirty="0"/>
-              <a:t>There is a small amount of correlation between unemployment and number of suicides but almost neglegable</a:t>
+              <a:t>Some of the variables had a division by gender</a:t>
+            </a:r>
+          </a:p>
+          <a:p>
+            <a:r>
+              <a:rPr lang="en-CH" sz="1100" dirty="0"/>
+              <a:t>Smoking has no correlation to number of suicides</a:t>
+            </a:r>
+          </a:p>
+          <a:p>
+            <a:pPr lvl="2"/>
+            <a:r>
+              <a:rPr lang="en-CH" sz="1100" dirty="0"/>
+              <a:t>Average smokers larger tandancy to commit suicid</a:t>
+            </a:r>
+            <a:r>
+              <a:rPr lang="fr-BE" sz="1100" dirty="0"/>
+              <a:t>e</a:t>
             </a:r>
           </a:p>
           <a:p>
@@ -1109,7 +934,7 @@
           <a:p>
             <a:fld id="{E6E8B6E9-C291-3B4B-AE9B-9D2ED4D32F18}" type="slidenum">
               <a:rPr lang="en-CH" smtClean="0"/>
-              <a:t>10</a:t>
+              <a:t>9</a:t>
             </a:fld>
             <a:endParaRPr lang="en-CH"/>
           </a:p>
@@ -1118,7 +943,7 @@
     </p:spTree>
     <p:extLst>
       <p:ext uri="{BB962C8B-B14F-4D97-AF65-F5344CB8AC3E}">
-        <p14:creationId xmlns:p14="http://schemas.microsoft.com/office/powerpoint/2010/main" val="1207234545"/>
+        <p14:creationId xmlns:p14="http://schemas.microsoft.com/office/powerpoint/2010/main" val="1996060125"/>
       </p:ext>
     </p:extLst>
   </p:cSld>
@@ -1173,18 +998,9 @@
           <a:lstStyle/>
           <a:p>
             <a:r>
-              <a:rPr lang="en-GB" dirty="0"/>
-              <a:t>For alcohol we decided to do a log-log analysis</a:t>
-            </a:r>
-            <a:endParaRPr lang="en-CH" dirty="0"/>
-          </a:p>
-          <a:p>
-            <a:pPr lvl="2"/>
-            <a:r>
-              <a:rPr lang="en-CH" dirty="0"/>
-              <a:t>Definite correlation between alcohol consumption and suicide rate</a:t>
-            </a:r>
-            <a:endParaRPr lang="en-GB" dirty="0"/>
+              <a:rPr lang="en-CH" sz="1100" dirty="0"/>
+              <a:t>There is a small amount of correlation between unemployment and number of suicides but almost neglegable</a:t>
+            </a:r>
           </a:p>
           <a:p>
             <a:endParaRPr lang="en-CH" dirty="0"/>
@@ -1208,6 +1024,105 @@
           <a:p>
             <a:fld id="{E6E8B6E9-C291-3B4B-AE9B-9D2ED4D32F18}" type="slidenum">
               <a:rPr lang="en-CH" smtClean="0"/>
+              <a:t>10</a:t>
+            </a:fld>
+            <a:endParaRPr lang="en-CH"/>
+          </a:p>
+        </p:txBody>
+      </p:sp>
+    </p:spTree>
+    <p:extLst>
+      <p:ext uri="{BB962C8B-B14F-4D97-AF65-F5344CB8AC3E}">
+        <p14:creationId xmlns:p14="http://schemas.microsoft.com/office/powerpoint/2010/main" val="1207234545"/>
+      </p:ext>
+    </p:extLst>
+  </p:cSld>
+  <p:clrMapOvr>
+    <a:masterClrMapping/>
+  </p:clrMapOvr>
+</p:notes>
+</file>
+
+<file path=ppt/notesSlides/notesSlide7.xml><?xml version="1.0" encoding="utf-8"?>
+<p:notes xmlns:a="http://schemas.openxmlformats.org/drawingml/2006/main" xmlns:r="http://schemas.openxmlformats.org/officeDocument/2006/relationships" xmlns:p="http://schemas.openxmlformats.org/presentationml/2006/main">
+  <p:cSld>
+    <p:spTree>
+      <p:nvGrpSpPr>
+        <p:cNvPr id="1" name=""/>
+        <p:cNvGrpSpPr/>
+        <p:nvPr/>
+      </p:nvGrpSpPr>
+      <p:grpSpPr>
+        <a:xfrm>
+          <a:off x="0" y="0"/>
+          <a:ext cx="0" cy="0"/>
+          <a:chOff x="0" y="0"/>
+          <a:chExt cx="0" cy="0"/>
+        </a:xfrm>
+      </p:grpSpPr>
+      <p:sp>
+        <p:nvSpPr>
+          <p:cNvPr id="2" name="Slide Image Placeholder 1"/>
+          <p:cNvSpPr>
+            <a:spLocks noGrp="1" noRot="1" noChangeAspect="1"/>
+          </p:cNvSpPr>
+          <p:nvPr>
+            <p:ph type="sldImg"/>
+          </p:nvPr>
+        </p:nvSpPr>
+        <p:spPr/>
+      </p:sp>
+      <p:sp>
+        <p:nvSpPr>
+          <p:cNvPr id="3" name="Notes Placeholder 2"/>
+          <p:cNvSpPr>
+            <a:spLocks noGrp="1"/>
+          </p:cNvSpPr>
+          <p:nvPr>
+            <p:ph type="body" idx="1"/>
+          </p:nvPr>
+        </p:nvSpPr>
+        <p:spPr/>
+        <p:txBody>
+          <a:bodyPr/>
+          <a:lstStyle/>
+          <a:p>
+            <a:r>
+              <a:rPr lang="en-GB" dirty="0"/>
+              <a:t>For alcohol we decided to do a log-log analysis</a:t>
+            </a:r>
+            <a:endParaRPr lang="en-CH" dirty="0"/>
+          </a:p>
+          <a:p>
+            <a:pPr lvl="2"/>
+            <a:r>
+              <a:rPr lang="en-CH" dirty="0"/>
+              <a:t>Definite correlation between alcohol consumption and suicide rate</a:t>
+            </a:r>
+            <a:endParaRPr lang="en-GB" dirty="0"/>
+          </a:p>
+          <a:p>
+            <a:endParaRPr lang="en-CH" dirty="0"/>
+          </a:p>
+        </p:txBody>
+      </p:sp>
+      <p:sp>
+        <p:nvSpPr>
+          <p:cNvPr id="4" name="Slide Number Placeholder 3"/>
+          <p:cNvSpPr>
+            <a:spLocks noGrp="1"/>
+          </p:cNvSpPr>
+          <p:nvPr>
+            <p:ph type="sldNum" sz="quarter" idx="5"/>
+          </p:nvPr>
+        </p:nvSpPr>
+        <p:spPr/>
+        <p:txBody>
+          <a:bodyPr/>
+          <a:lstStyle/>
+          <a:p>
+            <a:fld id="{E6E8B6E9-C291-3B4B-AE9B-9D2ED4D32F18}" type="slidenum">
+              <a:rPr lang="en-CH" smtClean="0"/>
               <a:t>11</a:t>
             </a:fld>
             <a:endParaRPr lang="en-CH"/>
@@ -1227,7 +1142,7 @@
 </p:notes>
 </file>
 
-<file path=ppt/notesSlides/notesSlide7.xml><?xml version="1.0" encoding="utf-8"?>
+<file path=ppt/notesSlides/notesSlide8.xml><?xml version="1.0" encoding="utf-8"?>
 <p:notes xmlns:a="http://schemas.openxmlformats.org/drawingml/2006/main" xmlns:r="http://schemas.openxmlformats.org/officeDocument/2006/relationships" xmlns:p="http://schemas.openxmlformats.org/presentationml/2006/main">
   <p:cSld>
     <p:spTree>
@@ -8059,6 +7974,230 @@
   <p:clrMapOvr>
     <a:masterClrMapping/>
   </p:clrMapOvr>
+  <p:timing>
+    <p:tnLst>
+      <p:par>
+        <p:cTn id="1" dur="indefinite" restart="never" nodeType="tmRoot">
+          <p:childTnLst>
+            <p:seq concurrent="1" nextAc="seek">
+              <p:cTn id="2" dur="indefinite" nodeType="mainSeq">
+                <p:childTnLst>
+                  <p:par>
+                    <p:cTn id="3" fill="hold">
+                      <p:stCondLst>
+                        <p:cond delay="indefinite"/>
+                      </p:stCondLst>
+                      <p:childTnLst>
+                        <p:par>
+                          <p:cTn id="4" fill="hold">
+                            <p:stCondLst>
+                              <p:cond delay="0"/>
+                            </p:stCondLst>
+                            <p:childTnLst>
+                              <p:par>
+                                <p:cTn id="5" presetID="1" presetClass="entr" presetSubtype="0" fill="hold" grpId="0" nodeType="clickEffect">
+                                  <p:stCondLst>
+                                    <p:cond delay="0"/>
+                                  </p:stCondLst>
+                                  <p:childTnLst>
+                                    <p:set>
+                                      <p:cBhvr>
+                                        <p:cTn id="6" dur="1" fill="hold">
+                                          <p:stCondLst>
+                                            <p:cond delay="0"/>
+                                          </p:stCondLst>
+                                        </p:cTn>
+                                        <p:tgtEl>
+                                          <p:spTgt spid="3">
+                                            <p:txEl>
+                                              <p:pRg st="0" end="0"/>
+                                            </p:txEl>
+                                          </p:spTgt>
+                                        </p:tgtEl>
+                                        <p:attrNameLst>
+                                          <p:attrName>style.visibility</p:attrName>
+                                        </p:attrNameLst>
+                                      </p:cBhvr>
+                                      <p:to>
+                                        <p:strVal val="visible"/>
+                                      </p:to>
+                                    </p:set>
+                                  </p:childTnLst>
+                                </p:cTn>
+                              </p:par>
+                              <p:par>
+                                <p:cTn id="7" presetID="1" presetClass="entr" presetSubtype="0" fill="hold" grpId="0" nodeType="withEffect">
+                                  <p:stCondLst>
+                                    <p:cond delay="0"/>
+                                  </p:stCondLst>
+                                  <p:childTnLst>
+                                    <p:set>
+                                      <p:cBhvr>
+                                        <p:cTn id="8" dur="1" fill="hold">
+                                          <p:stCondLst>
+                                            <p:cond delay="0"/>
+                                          </p:stCondLst>
+                                        </p:cTn>
+                                        <p:tgtEl>
+                                          <p:spTgt spid="3">
+                                            <p:txEl>
+                                              <p:pRg st="1" end="1"/>
+                                            </p:txEl>
+                                          </p:spTgt>
+                                        </p:tgtEl>
+                                        <p:attrNameLst>
+                                          <p:attrName>style.visibility</p:attrName>
+                                        </p:attrNameLst>
+                                      </p:cBhvr>
+                                      <p:to>
+                                        <p:strVal val="visible"/>
+                                      </p:to>
+                                    </p:set>
+                                  </p:childTnLst>
+                                </p:cTn>
+                              </p:par>
+                              <p:par>
+                                <p:cTn id="9" presetID="1" presetClass="entr" presetSubtype="0" fill="hold" grpId="0" nodeType="withEffect">
+                                  <p:stCondLst>
+                                    <p:cond delay="0"/>
+                                  </p:stCondLst>
+                                  <p:childTnLst>
+                                    <p:set>
+                                      <p:cBhvr>
+                                        <p:cTn id="10" dur="1" fill="hold">
+                                          <p:stCondLst>
+                                            <p:cond delay="0"/>
+                                          </p:stCondLst>
+                                        </p:cTn>
+                                        <p:tgtEl>
+                                          <p:spTgt spid="3">
+                                            <p:txEl>
+                                              <p:pRg st="2" end="2"/>
+                                            </p:txEl>
+                                          </p:spTgt>
+                                        </p:tgtEl>
+                                        <p:attrNameLst>
+                                          <p:attrName>style.visibility</p:attrName>
+                                        </p:attrNameLst>
+                                      </p:cBhvr>
+                                      <p:to>
+                                        <p:strVal val="visible"/>
+                                      </p:to>
+                                    </p:set>
+                                  </p:childTnLst>
+                                </p:cTn>
+                              </p:par>
+                            </p:childTnLst>
+                          </p:cTn>
+                        </p:par>
+                      </p:childTnLst>
+                    </p:cTn>
+                  </p:par>
+                  <p:par>
+                    <p:cTn id="11" fill="hold">
+                      <p:stCondLst>
+                        <p:cond delay="indefinite"/>
+                      </p:stCondLst>
+                      <p:childTnLst>
+                        <p:par>
+                          <p:cTn id="12" fill="hold">
+                            <p:stCondLst>
+                              <p:cond delay="0"/>
+                            </p:stCondLst>
+                            <p:childTnLst>
+                              <p:par>
+                                <p:cTn id="13" presetID="1" presetClass="entr" presetSubtype="0" fill="hold" grpId="0" nodeType="clickEffect">
+                                  <p:stCondLst>
+                                    <p:cond delay="0"/>
+                                  </p:stCondLst>
+                                  <p:childTnLst>
+                                    <p:set>
+                                      <p:cBhvr>
+                                        <p:cTn id="14" dur="1" fill="hold">
+                                          <p:stCondLst>
+                                            <p:cond delay="0"/>
+                                          </p:stCondLst>
+                                        </p:cTn>
+                                        <p:tgtEl>
+                                          <p:spTgt spid="3">
+                                            <p:txEl>
+                                              <p:pRg st="3" end="3"/>
+                                            </p:txEl>
+                                          </p:spTgt>
+                                        </p:tgtEl>
+                                        <p:attrNameLst>
+                                          <p:attrName>style.visibility</p:attrName>
+                                        </p:attrNameLst>
+                                      </p:cBhvr>
+                                      <p:to>
+                                        <p:strVal val="visible"/>
+                                      </p:to>
+                                    </p:set>
+                                  </p:childTnLst>
+                                </p:cTn>
+                              </p:par>
+                              <p:par>
+                                <p:cTn id="15" presetID="1" presetClass="entr" presetSubtype="0" fill="hold" grpId="0" nodeType="withEffect">
+                                  <p:stCondLst>
+                                    <p:cond delay="0"/>
+                                  </p:stCondLst>
+                                  <p:childTnLst>
+                                    <p:set>
+                                      <p:cBhvr>
+                                        <p:cTn id="16" dur="1" fill="hold">
+                                          <p:stCondLst>
+                                            <p:cond delay="0"/>
+                                          </p:stCondLst>
+                                        </p:cTn>
+                                        <p:tgtEl>
+                                          <p:spTgt spid="3">
+                                            <p:txEl>
+                                              <p:pRg st="4" end="4"/>
+                                            </p:txEl>
+                                          </p:spTgt>
+                                        </p:tgtEl>
+                                        <p:attrNameLst>
+                                          <p:attrName>style.visibility</p:attrName>
+                                        </p:attrNameLst>
+                                      </p:cBhvr>
+                                      <p:to>
+                                        <p:strVal val="visible"/>
+                                      </p:to>
+                                    </p:set>
+                                  </p:childTnLst>
+                                </p:cTn>
+                              </p:par>
+                            </p:childTnLst>
+                          </p:cTn>
+                        </p:par>
+                      </p:childTnLst>
+                    </p:cTn>
+                  </p:par>
+                </p:childTnLst>
+              </p:cTn>
+              <p:prevCondLst>
+                <p:cond evt="onPrev" delay="0">
+                  <p:tgtEl>
+                    <p:sldTgt/>
+                  </p:tgtEl>
+                </p:cond>
+              </p:prevCondLst>
+              <p:nextCondLst>
+                <p:cond evt="onNext" delay="0">
+                  <p:tgtEl>
+                    <p:sldTgt/>
+                  </p:tgtEl>
+                </p:cond>
+              </p:nextCondLst>
+            </p:seq>
+          </p:childTnLst>
+        </p:cTn>
+      </p:par>
+    </p:tnLst>
+    <p:bldLst>
+      <p:bldP spid="3" grpId="0" build="p"/>
+    </p:bldLst>
+  </p:timing>
 </p:sld>
 </file>
 
@@ -9288,103 +9427,6 @@
       </p:grpSpPr>
       <p:sp>
         <p:nvSpPr>
-          <p:cNvPr id="14" name="ZoneTexte 13">
-            <a:extLst>
-              <a:ext uri="{FF2B5EF4-FFF2-40B4-BE49-F238E27FC236}">
-                <a16:creationId xmlns:a16="http://schemas.microsoft.com/office/drawing/2014/main" id="{A41BC286-0AF1-4368-B284-8E1F71E435FE}"/>
-              </a:ext>
-            </a:extLst>
-          </p:cNvPr>
-          <p:cNvSpPr txBox="1"/>
-          <p:nvPr/>
-        </p:nvSpPr>
-        <p:spPr>
-          <a:xfrm>
-            <a:off x="3293574" y="3555641"/>
-            <a:ext cx="3652287" cy="2308324"/>
-          </a:xfrm>
-          <a:prstGeom prst="rect">
-            <a:avLst/>
-          </a:prstGeom>
-          <a:noFill/>
-        </p:spPr>
-        <p:txBody>
-          <a:bodyPr wrap="square" rtlCol="0">
-            <a:spAutoFit/>
-          </a:bodyPr>
-          <a:lstStyle/>
-          <a:p>
-            <a:pPr marL="720000" lvl="2" indent="0">
-              <a:buNone/>
-            </a:pPr>
-            <a:r>
-              <a:rPr lang="en-CH" dirty="0"/>
-              <a:t>Smoking</a:t>
-            </a:r>
-            <a:r>
-              <a:rPr lang="fr-BE" dirty="0"/>
-              <a:t> </a:t>
-            </a:r>
-            <a:r>
-              <a:rPr lang="fr-BE" dirty="0" err="1"/>
-              <a:t>habbits</a:t>
-            </a:r>
-            <a:endParaRPr lang="fr-BE" dirty="0"/>
-          </a:p>
-          <a:p>
-            <a:pPr marL="720000" lvl="2" indent="0">
-              <a:buNone/>
-            </a:pPr>
-            <a:endParaRPr lang="en-CH" dirty="0"/>
-          </a:p>
-          <a:p>
-            <a:pPr marL="720000" lvl="2" indent="0">
-              <a:buNone/>
-            </a:pPr>
-            <a:r>
-              <a:rPr lang="en-CH" dirty="0"/>
-              <a:t>Alcohol consumption</a:t>
-            </a:r>
-            <a:endParaRPr lang="fr-BE" dirty="0"/>
-          </a:p>
-          <a:p>
-            <a:pPr marL="720000" lvl="2" indent="0">
-              <a:buNone/>
-            </a:pPr>
-            <a:endParaRPr lang="en-CH" dirty="0"/>
-          </a:p>
-          <a:p>
-            <a:pPr marL="720000" lvl="2" indent="0">
-              <a:buNone/>
-            </a:pPr>
-            <a:r>
-              <a:rPr lang="en-CH" dirty="0"/>
-              <a:t>Unemployment rate</a:t>
-            </a:r>
-            <a:endParaRPr lang="fr-BE" dirty="0"/>
-          </a:p>
-          <a:p>
-            <a:pPr marL="720000" lvl="2" indent="0">
-              <a:buNone/>
-            </a:pPr>
-            <a:endParaRPr lang="en-CH" dirty="0"/>
-          </a:p>
-          <a:p>
-            <a:pPr marL="720000" lvl="2" indent="0">
-              <a:buNone/>
-            </a:pPr>
-            <a:r>
-              <a:rPr lang="en-CH" dirty="0"/>
-              <a:t>Population</a:t>
-            </a:r>
-          </a:p>
-          <a:p>
-            <a:endParaRPr lang="fr-BE" dirty="0"/>
-          </a:p>
-        </p:txBody>
-      </p:sp>
-      <p:sp>
-        <p:nvSpPr>
           <p:cNvPr id="2" name="Title 1">
             <a:extLst>
               <a:ext uri="{FF2B5EF4-FFF2-40B4-BE49-F238E27FC236}">
@@ -9475,150 +9517,268 @@
           </a:p>
         </p:txBody>
       </p:sp>
-      <p:pic>
-        <p:nvPicPr>
-          <p:cNvPr id="5" name="Graphique 4" descr="Fumer avec un remplissage uni">
+      <p:grpSp>
+        <p:nvGrpSpPr>
+          <p:cNvPr id="4" name="Group 3">
             <a:extLst>
               <a:ext uri="{FF2B5EF4-FFF2-40B4-BE49-F238E27FC236}">
-                <a16:creationId xmlns:a16="http://schemas.microsoft.com/office/drawing/2014/main" id="{58B91BC7-6B03-4E71-8992-AAA29DE663E8}"/>
+                <a16:creationId xmlns:a16="http://schemas.microsoft.com/office/drawing/2014/main" id="{9A415DFC-B558-844E-87EC-04CF9C150878}"/>
               </a:ext>
             </a:extLst>
           </p:cNvPr>
-          <p:cNvPicPr>
-            <a:picLocks noChangeAspect="1"/>
-          </p:cNvPicPr>
+          <p:cNvGrpSpPr/>
           <p:nvPr/>
-        </p:nvPicPr>
-        <p:blipFill>
-          <a:blip r:embed="rId3">
-            <a:extLst>
-              <a:ext uri="{96DAC541-7B7A-43D3-8B79-37D633B846F1}">
-                <asvg:svgBlip xmlns:asvg="http://schemas.microsoft.com/office/drawing/2016/SVG/main" r:embed="rId4"/>
-              </a:ext>
-            </a:extLst>
-          </a:blip>
-          <a:stretch>
-            <a:fillRect/>
-          </a:stretch>
-        </p:blipFill>
-        <p:spPr>
+        </p:nvGrpSpPr>
+        <p:grpSpPr>
           <a:xfrm>
-            <a:off x="3303365" y="3489912"/>
-            <a:ext cx="371060" cy="371060"/>
+            <a:off x="2004300" y="3429000"/>
+            <a:ext cx="3682104" cy="2390115"/>
+            <a:chOff x="3263757" y="3489912"/>
+            <a:chExt cx="3682104" cy="2390115"/>
           </a:xfrm>
-          <a:prstGeom prst="rect">
-            <a:avLst/>
-          </a:prstGeom>
-        </p:spPr>
-      </p:pic>
-      <p:pic>
-        <p:nvPicPr>
-          <p:cNvPr id="9" name="Graphique 8" descr="Vin avec un remplissage uni">
-            <a:extLst>
-              <a:ext uri="{FF2B5EF4-FFF2-40B4-BE49-F238E27FC236}">
-                <a16:creationId xmlns:a16="http://schemas.microsoft.com/office/drawing/2014/main" id="{554F1E2F-EA6E-49E8-B039-3E058F4FEA6F}"/>
-              </a:ext>
-            </a:extLst>
-          </p:cNvPr>
-          <p:cNvPicPr>
-            <a:picLocks noChangeAspect="1"/>
-          </p:cNvPicPr>
-          <p:nvPr/>
-        </p:nvPicPr>
-        <p:blipFill>
-          <a:blip r:embed="rId5">
-            <a:extLst>
-              <a:ext uri="{96DAC541-7B7A-43D3-8B79-37D633B846F1}">
-                <asvg:svgBlip xmlns:asvg="http://schemas.microsoft.com/office/drawing/2016/SVG/main" r:embed="rId6"/>
-              </a:ext>
-            </a:extLst>
-          </a:blip>
-          <a:stretch>
-            <a:fillRect/>
-          </a:stretch>
-        </p:blipFill>
-        <p:spPr>
-          <a:xfrm>
-            <a:off x="3263757" y="4103351"/>
-            <a:ext cx="371061" cy="371061"/>
-          </a:xfrm>
-          <a:prstGeom prst="rect">
-            <a:avLst/>
-          </a:prstGeom>
-        </p:spPr>
-      </p:pic>
-      <p:pic>
-        <p:nvPicPr>
-          <p:cNvPr id="11" name="Graphique 10" descr="Groupe de personnes avec un remplissage uni">
-            <a:extLst>
-              <a:ext uri="{FF2B5EF4-FFF2-40B4-BE49-F238E27FC236}">
-                <a16:creationId xmlns:a16="http://schemas.microsoft.com/office/drawing/2014/main" id="{34C82069-B69D-45E4-BB29-C2F9F73B0921}"/>
-              </a:ext>
-            </a:extLst>
-          </p:cNvPr>
-          <p:cNvPicPr>
-            <a:picLocks noChangeAspect="1"/>
-          </p:cNvPicPr>
-          <p:nvPr/>
-        </p:nvPicPr>
-        <p:blipFill>
-          <a:blip r:embed="rId7">
-            <a:extLst>
-              <a:ext uri="{96DAC541-7B7A-43D3-8B79-37D633B846F1}">
-                <asvg:svgBlip xmlns:asvg="http://schemas.microsoft.com/office/drawing/2016/SVG/main" r:embed="rId8"/>
-              </a:ext>
-            </a:extLst>
-          </a:blip>
-          <a:stretch>
-            <a:fillRect/>
-          </a:stretch>
-        </p:blipFill>
-        <p:spPr>
-          <a:xfrm>
-            <a:off x="3303365" y="5222084"/>
-            <a:ext cx="316397" cy="316397"/>
-          </a:xfrm>
-          <a:prstGeom prst="rect">
-            <a:avLst/>
-          </a:prstGeom>
-        </p:spPr>
-      </p:pic>
-      <p:pic>
-        <p:nvPicPr>
-          <p:cNvPr id="13" name="Graphique 12" descr="Porte-bloc avec un remplissage uni">
-            <a:extLst>
-              <a:ext uri="{FF2B5EF4-FFF2-40B4-BE49-F238E27FC236}">
-                <a16:creationId xmlns:a16="http://schemas.microsoft.com/office/drawing/2014/main" id="{4FFA1226-875E-45DD-B204-F49E99CAD61B}"/>
-              </a:ext>
-            </a:extLst>
-          </p:cNvPr>
-          <p:cNvPicPr>
-            <a:picLocks noChangeAspect="1"/>
-          </p:cNvPicPr>
-          <p:nvPr/>
-        </p:nvPicPr>
-        <p:blipFill>
-          <a:blip r:embed="rId9">
-            <a:extLst>
-              <a:ext uri="{96DAC541-7B7A-43D3-8B79-37D633B846F1}">
-                <asvg:svgBlip xmlns:asvg="http://schemas.microsoft.com/office/drawing/2016/SVG/main" r:embed="rId10"/>
-              </a:ext>
-            </a:extLst>
-          </a:blip>
-          <a:stretch>
-            <a:fillRect/>
-          </a:stretch>
-        </p:blipFill>
-        <p:spPr>
-          <a:xfrm>
-            <a:off x="3293574" y="4667184"/>
-            <a:ext cx="311426" cy="311426"/>
-          </a:xfrm>
-          <a:prstGeom prst="rect">
-            <a:avLst/>
-          </a:prstGeom>
-        </p:spPr>
-      </p:pic>
+        </p:grpSpPr>
+        <p:sp>
+          <p:nvSpPr>
+            <p:cNvPr id="14" name="ZoneTexte 13">
+              <a:extLst>
+                <a:ext uri="{FF2B5EF4-FFF2-40B4-BE49-F238E27FC236}">
+                  <a16:creationId xmlns:a16="http://schemas.microsoft.com/office/drawing/2014/main" id="{A41BC286-0AF1-4368-B284-8E1F71E435FE}"/>
+                </a:ext>
+              </a:extLst>
+            </p:cNvPr>
+            <p:cNvSpPr txBox="1"/>
+            <p:nvPr/>
+          </p:nvSpPr>
+          <p:spPr>
+            <a:xfrm>
+              <a:off x="3293574" y="3571703"/>
+              <a:ext cx="3652287" cy="2308324"/>
+            </a:xfrm>
+            <a:prstGeom prst="rect">
+              <a:avLst/>
+            </a:prstGeom>
+            <a:noFill/>
+          </p:spPr>
+          <p:txBody>
+            <a:bodyPr wrap="square" rtlCol="0">
+              <a:spAutoFit/>
+            </a:bodyPr>
+            <a:lstStyle/>
+            <a:p>
+              <a:pPr marL="720000" lvl="2" indent="0">
+                <a:buNone/>
+              </a:pPr>
+              <a:r>
+                <a:rPr lang="en-CH" dirty="0"/>
+                <a:t>Smoking</a:t>
+              </a:r>
+              <a:r>
+                <a:rPr lang="fr-BE" dirty="0"/>
+                <a:t> </a:t>
+              </a:r>
+              <a:r>
+                <a:rPr lang="fr-BE" dirty="0" err="1"/>
+                <a:t>habbits</a:t>
+              </a:r>
+              <a:endParaRPr lang="fr-BE" dirty="0"/>
+            </a:p>
+            <a:p>
+              <a:pPr marL="720000" lvl="2" indent="0">
+                <a:buNone/>
+              </a:pPr>
+              <a:endParaRPr lang="en-CH" dirty="0"/>
+            </a:p>
+            <a:p>
+              <a:pPr marL="720000" lvl="2" indent="0">
+                <a:buNone/>
+              </a:pPr>
+              <a:r>
+                <a:rPr lang="en-CH" dirty="0"/>
+                <a:t>Alcohol consumption</a:t>
+              </a:r>
+              <a:endParaRPr lang="fr-BE" dirty="0"/>
+            </a:p>
+            <a:p>
+              <a:pPr marL="720000" lvl="2" indent="0">
+                <a:buNone/>
+              </a:pPr>
+              <a:endParaRPr lang="en-CH" dirty="0"/>
+            </a:p>
+            <a:p>
+              <a:pPr marL="720000" lvl="2" indent="0">
+                <a:buNone/>
+              </a:pPr>
+              <a:r>
+                <a:rPr lang="en-CH" dirty="0"/>
+                <a:t>Unemployment rate</a:t>
+              </a:r>
+              <a:endParaRPr lang="fr-BE" dirty="0"/>
+            </a:p>
+            <a:p>
+              <a:pPr marL="720000" lvl="2" indent="0">
+                <a:buNone/>
+              </a:pPr>
+              <a:endParaRPr lang="en-CH" dirty="0"/>
+            </a:p>
+            <a:p>
+              <a:pPr marL="720000" lvl="2" indent="0">
+                <a:buNone/>
+              </a:pPr>
+              <a:r>
+                <a:rPr lang="en-CH" dirty="0"/>
+                <a:t>Population</a:t>
+              </a:r>
+            </a:p>
+            <a:p>
+              <a:endParaRPr lang="fr-BE" dirty="0"/>
+            </a:p>
+          </p:txBody>
+        </p:sp>
+        <p:pic>
+          <p:nvPicPr>
+            <p:cNvPr id="5" name="Graphique 4" descr="Fumer avec un remplissage uni">
+              <a:extLst>
+                <a:ext uri="{FF2B5EF4-FFF2-40B4-BE49-F238E27FC236}">
+                  <a16:creationId xmlns:a16="http://schemas.microsoft.com/office/drawing/2014/main" id="{58B91BC7-6B03-4E71-8992-AAA29DE663E8}"/>
+                </a:ext>
+              </a:extLst>
+            </p:cNvPr>
+            <p:cNvPicPr>
+              <a:picLocks noChangeAspect="1"/>
+            </p:cNvPicPr>
+            <p:nvPr/>
+          </p:nvPicPr>
+          <p:blipFill>
+            <a:blip r:embed="rId3">
+              <a:extLst>
+                <a:ext uri="{96DAC541-7B7A-43D3-8B79-37D633B846F1}">
+                  <asvg:svgBlip xmlns:asvg="http://schemas.microsoft.com/office/drawing/2016/SVG/main" r:embed="rId4"/>
+                </a:ext>
+              </a:extLst>
+            </a:blip>
+            <a:stretch>
+              <a:fillRect/>
+            </a:stretch>
+          </p:blipFill>
+          <p:spPr>
+            <a:xfrm>
+              <a:off x="3303365" y="3489912"/>
+              <a:ext cx="371060" cy="371060"/>
+            </a:xfrm>
+            <a:prstGeom prst="rect">
+              <a:avLst/>
+            </a:prstGeom>
+          </p:spPr>
+        </p:pic>
+        <p:pic>
+          <p:nvPicPr>
+            <p:cNvPr id="9" name="Graphique 8" descr="Vin avec un remplissage uni">
+              <a:extLst>
+                <a:ext uri="{FF2B5EF4-FFF2-40B4-BE49-F238E27FC236}">
+                  <a16:creationId xmlns:a16="http://schemas.microsoft.com/office/drawing/2014/main" id="{554F1E2F-EA6E-49E8-B039-3E058F4FEA6F}"/>
+                </a:ext>
+              </a:extLst>
+            </p:cNvPr>
+            <p:cNvPicPr>
+              <a:picLocks noChangeAspect="1"/>
+            </p:cNvPicPr>
+            <p:nvPr/>
+          </p:nvPicPr>
+          <p:blipFill>
+            <a:blip r:embed="rId5">
+              <a:extLst>
+                <a:ext uri="{96DAC541-7B7A-43D3-8B79-37D633B846F1}">
+                  <asvg:svgBlip xmlns:asvg="http://schemas.microsoft.com/office/drawing/2016/SVG/main" r:embed="rId6"/>
+                </a:ext>
+              </a:extLst>
+            </a:blip>
+            <a:stretch>
+              <a:fillRect/>
+            </a:stretch>
+          </p:blipFill>
+          <p:spPr>
+            <a:xfrm>
+              <a:off x="3263757" y="4103351"/>
+              <a:ext cx="371061" cy="371061"/>
+            </a:xfrm>
+            <a:prstGeom prst="rect">
+              <a:avLst/>
+            </a:prstGeom>
+          </p:spPr>
+        </p:pic>
+        <p:pic>
+          <p:nvPicPr>
+            <p:cNvPr id="11" name="Graphique 10" descr="Groupe de personnes avec un remplissage uni">
+              <a:extLst>
+                <a:ext uri="{FF2B5EF4-FFF2-40B4-BE49-F238E27FC236}">
+                  <a16:creationId xmlns:a16="http://schemas.microsoft.com/office/drawing/2014/main" id="{34C82069-B69D-45E4-BB29-C2F9F73B0921}"/>
+                </a:ext>
+              </a:extLst>
+            </p:cNvPr>
+            <p:cNvPicPr>
+              <a:picLocks noChangeAspect="1"/>
+            </p:cNvPicPr>
+            <p:nvPr/>
+          </p:nvPicPr>
+          <p:blipFill>
+            <a:blip r:embed="rId7">
+              <a:extLst>
+                <a:ext uri="{96DAC541-7B7A-43D3-8B79-37D633B846F1}">
+                  <asvg:svgBlip xmlns:asvg="http://schemas.microsoft.com/office/drawing/2016/SVG/main" r:embed="rId8"/>
+                </a:ext>
+              </a:extLst>
+            </a:blip>
+            <a:stretch>
+              <a:fillRect/>
+            </a:stretch>
+          </p:blipFill>
+          <p:spPr>
+            <a:xfrm>
+              <a:off x="3303365" y="5222084"/>
+              <a:ext cx="316397" cy="316397"/>
+            </a:xfrm>
+            <a:prstGeom prst="rect">
+              <a:avLst/>
+            </a:prstGeom>
+          </p:spPr>
+        </p:pic>
+        <p:pic>
+          <p:nvPicPr>
+            <p:cNvPr id="13" name="Graphique 12" descr="Porte-bloc avec un remplissage uni">
+              <a:extLst>
+                <a:ext uri="{FF2B5EF4-FFF2-40B4-BE49-F238E27FC236}">
+                  <a16:creationId xmlns:a16="http://schemas.microsoft.com/office/drawing/2014/main" id="{4FFA1226-875E-45DD-B204-F49E99CAD61B}"/>
+                </a:ext>
+              </a:extLst>
+            </p:cNvPr>
+            <p:cNvPicPr>
+              <a:picLocks noChangeAspect="1"/>
+            </p:cNvPicPr>
+            <p:nvPr/>
+          </p:nvPicPr>
+          <p:blipFill>
+            <a:blip r:embed="rId9">
+              <a:extLst>
+                <a:ext uri="{96DAC541-7B7A-43D3-8B79-37D633B846F1}">
+                  <asvg:svgBlip xmlns:asvg="http://schemas.microsoft.com/office/drawing/2016/SVG/main" r:embed="rId10"/>
+                </a:ext>
+              </a:extLst>
+            </a:blip>
+            <a:stretch>
+              <a:fillRect/>
+            </a:stretch>
+          </p:blipFill>
+          <p:spPr>
+            <a:xfrm>
+              <a:off x="3293574" y="4667184"/>
+              <a:ext cx="311426" cy="311426"/>
+            </a:xfrm>
+            <a:prstGeom prst="rect">
+              <a:avLst/>
+            </a:prstGeom>
+          </p:spPr>
+        </p:pic>
+      </p:grpSp>
     </p:spTree>
     <p:extLst>
       <p:ext uri="{BB962C8B-B14F-4D97-AF65-F5344CB8AC3E}">
@@ -9629,6 +9789,262 @@
   <p:clrMapOvr>
     <a:masterClrMapping/>
   </p:clrMapOvr>
+  <p:timing>
+    <p:tnLst>
+      <p:par>
+        <p:cTn id="1" dur="indefinite" restart="never" nodeType="tmRoot">
+          <p:childTnLst>
+            <p:seq concurrent="1" nextAc="seek">
+              <p:cTn id="2" dur="indefinite" nodeType="mainSeq">
+                <p:childTnLst>
+                  <p:par>
+                    <p:cTn id="3" fill="hold">
+                      <p:stCondLst>
+                        <p:cond delay="indefinite"/>
+                      </p:stCondLst>
+                      <p:childTnLst>
+                        <p:par>
+                          <p:cTn id="4" fill="hold">
+                            <p:stCondLst>
+                              <p:cond delay="0"/>
+                            </p:stCondLst>
+                            <p:childTnLst>
+                              <p:par>
+                                <p:cTn id="5" presetID="1" presetClass="entr" presetSubtype="0" fill="hold" grpId="0" nodeType="clickEffect">
+                                  <p:stCondLst>
+                                    <p:cond delay="0"/>
+                                  </p:stCondLst>
+                                  <p:childTnLst>
+                                    <p:set>
+                                      <p:cBhvr>
+                                        <p:cTn id="6" dur="1" fill="hold">
+                                          <p:stCondLst>
+                                            <p:cond delay="0"/>
+                                          </p:stCondLst>
+                                        </p:cTn>
+                                        <p:tgtEl>
+                                          <p:spTgt spid="3">
+                                            <p:txEl>
+                                              <p:pRg st="0" end="0"/>
+                                            </p:txEl>
+                                          </p:spTgt>
+                                        </p:tgtEl>
+                                        <p:attrNameLst>
+                                          <p:attrName>style.visibility</p:attrName>
+                                        </p:attrNameLst>
+                                      </p:cBhvr>
+                                      <p:to>
+                                        <p:strVal val="visible"/>
+                                      </p:to>
+                                    </p:set>
+                                  </p:childTnLst>
+                                </p:cTn>
+                              </p:par>
+                            </p:childTnLst>
+                          </p:cTn>
+                        </p:par>
+                      </p:childTnLst>
+                    </p:cTn>
+                  </p:par>
+                  <p:par>
+                    <p:cTn id="7" fill="hold">
+                      <p:stCondLst>
+                        <p:cond delay="indefinite"/>
+                      </p:stCondLst>
+                      <p:childTnLst>
+                        <p:par>
+                          <p:cTn id="8" fill="hold">
+                            <p:stCondLst>
+                              <p:cond delay="0"/>
+                            </p:stCondLst>
+                            <p:childTnLst>
+                              <p:par>
+                                <p:cTn id="9" presetID="1" presetClass="entr" presetSubtype="0" fill="hold" grpId="0" nodeType="clickEffect">
+                                  <p:stCondLst>
+                                    <p:cond delay="0"/>
+                                  </p:stCondLst>
+                                  <p:childTnLst>
+                                    <p:set>
+                                      <p:cBhvr>
+                                        <p:cTn id="10" dur="1" fill="hold">
+                                          <p:stCondLst>
+                                            <p:cond delay="0"/>
+                                          </p:stCondLst>
+                                        </p:cTn>
+                                        <p:tgtEl>
+                                          <p:spTgt spid="3">
+                                            <p:txEl>
+                                              <p:pRg st="1" end="1"/>
+                                            </p:txEl>
+                                          </p:spTgt>
+                                        </p:tgtEl>
+                                        <p:attrNameLst>
+                                          <p:attrName>style.visibility</p:attrName>
+                                        </p:attrNameLst>
+                                      </p:cBhvr>
+                                      <p:to>
+                                        <p:strVal val="visible"/>
+                                      </p:to>
+                                    </p:set>
+                                  </p:childTnLst>
+                                </p:cTn>
+                              </p:par>
+                            </p:childTnLst>
+                          </p:cTn>
+                        </p:par>
+                      </p:childTnLst>
+                    </p:cTn>
+                  </p:par>
+                  <p:par>
+                    <p:cTn id="11" fill="hold">
+                      <p:stCondLst>
+                        <p:cond delay="indefinite"/>
+                      </p:stCondLst>
+                      <p:childTnLst>
+                        <p:par>
+                          <p:cTn id="12" fill="hold">
+                            <p:stCondLst>
+                              <p:cond delay="0"/>
+                            </p:stCondLst>
+                            <p:childTnLst>
+                              <p:par>
+                                <p:cTn id="13" presetID="1" presetClass="entr" presetSubtype="0" fill="hold" grpId="0" nodeType="clickEffect">
+                                  <p:stCondLst>
+                                    <p:cond delay="0"/>
+                                  </p:stCondLst>
+                                  <p:childTnLst>
+                                    <p:set>
+                                      <p:cBhvr>
+                                        <p:cTn id="14" dur="1" fill="hold">
+                                          <p:stCondLst>
+                                            <p:cond delay="0"/>
+                                          </p:stCondLst>
+                                        </p:cTn>
+                                        <p:tgtEl>
+                                          <p:spTgt spid="3">
+                                            <p:txEl>
+                                              <p:pRg st="2" end="2"/>
+                                            </p:txEl>
+                                          </p:spTgt>
+                                        </p:tgtEl>
+                                        <p:attrNameLst>
+                                          <p:attrName>style.visibility</p:attrName>
+                                        </p:attrNameLst>
+                                      </p:cBhvr>
+                                      <p:to>
+                                        <p:strVal val="visible"/>
+                                      </p:to>
+                                    </p:set>
+                                  </p:childTnLst>
+                                </p:cTn>
+                              </p:par>
+                              <p:par>
+                                <p:cTn id="15" presetID="1" presetClass="entr" presetSubtype="0" fill="hold" grpId="0" nodeType="withEffect">
+                                  <p:stCondLst>
+                                    <p:cond delay="0"/>
+                                  </p:stCondLst>
+                                  <p:childTnLst>
+                                    <p:set>
+                                      <p:cBhvr>
+                                        <p:cTn id="16" dur="1" fill="hold">
+                                          <p:stCondLst>
+                                            <p:cond delay="0"/>
+                                          </p:stCondLst>
+                                        </p:cTn>
+                                        <p:tgtEl>
+                                          <p:spTgt spid="3">
+                                            <p:txEl>
+                                              <p:pRg st="4" end="4"/>
+                                            </p:txEl>
+                                          </p:spTgt>
+                                        </p:tgtEl>
+                                        <p:attrNameLst>
+                                          <p:attrName>style.visibility</p:attrName>
+                                        </p:attrNameLst>
+                                      </p:cBhvr>
+                                      <p:to>
+                                        <p:strVal val="visible"/>
+                                      </p:to>
+                                    </p:set>
+                                  </p:childTnLst>
+                                </p:cTn>
+                              </p:par>
+                            </p:childTnLst>
+                          </p:cTn>
+                        </p:par>
+                      </p:childTnLst>
+                    </p:cTn>
+                  </p:par>
+                  <p:par>
+                    <p:cTn id="17" fill="hold">
+                      <p:stCondLst>
+                        <p:cond delay="indefinite"/>
+                      </p:stCondLst>
+                      <p:childTnLst>
+                        <p:par>
+                          <p:cTn id="18" fill="hold">
+                            <p:stCondLst>
+                              <p:cond delay="0"/>
+                            </p:stCondLst>
+                            <p:childTnLst>
+                              <p:par>
+                                <p:cTn id="19" presetID="1" presetClass="entr" presetSubtype="0" fill="hold" nodeType="clickEffect">
+                                  <p:stCondLst>
+                                    <p:cond delay="0"/>
+                                  </p:stCondLst>
+                                  <p:childTnLst>
+                                    <p:set>
+                                      <p:cBhvr>
+                                        <p:cTn id="20" dur="1" fill="hold">
+                                          <p:stCondLst>
+                                            <p:cond delay="0"/>
+                                          </p:stCondLst>
+                                        </p:cTn>
+                                        <p:tgtEl>
+                                          <p:spTgt spid="4"/>
+                                        </p:tgtEl>
+                                        <p:attrNameLst>
+                                          <p:attrName>style.visibility</p:attrName>
+                                        </p:attrNameLst>
+                                      </p:cBhvr>
+                                      <p:to>
+                                        <p:strVal val="visible"/>
+                                      </p:to>
+                                    </p:set>
+                                  </p:childTnLst>
+                                </p:cTn>
+                              </p:par>
+                            </p:childTnLst>
+                          </p:cTn>
+                        </p:par>
+                      </p:childTnLst>
+                    </p:cTn>
+                  </p:par>
+                </p:childTnLst>
+              </p:cTn>
+              <p:prevCondLst>
+                <p:cond evt="onPrev" delay="0">
+                  <p:tgtEl>
+                    <p:sldTgt/>
+                  </p:tgtEl>
+                </p:cond>
+              </p:prevCondLst>
+              <p:nextCondLst>
+                <p:cond evt="onNext" delay="0">
+                  <p:tgtEl>
+                    <p:sldTgt/>
+                  </p:tgtEl>
+                </p:cond>
+              </p:nextCondLst>
+            </p:seq>
+          </p:childTnLst>
+        </p:cTn>
+      </p:par>
+    </p:tnLst>
+    <p:bldLst>
+      <p:bldP spid="3" grpId="0" uiExpand="1" build="p"/>
+    </p:bldLst>
+  </p:timing>
 </p:sld>
 </file>
 
@@ -10043,6 +10459,377 @@
   <p:clrMapOvr>
     <a:masterClrMapping/>
   </p:clrMapOvr>
+  <p:timing>
+    <p:tnLst>
+      <p:par>
+        <p:cTn id="1" dur="indefinite" restart="never" nodeType="tmRoot">
+          <p:childTnLst>
+            <p:seq concurrent="1" nextAc="seek">
+              <p:cTn id="2" dur="indefinite" nodeType="mainSeq">
+                <p:childTnLst>
+                  <p:par>
+                    <p:cTn id="3" fill="hold">
+                      <p:stCondLst>
+                        <p:cond delay="indefinite"/>
+                      </p:stCondLst>
+                      <p:childTnLst>
+                        <p:par>
+                          <p:cTn id="4" fill="hold">
+                            <p:stCondLst>
+                              <p:cond delay="0"/>
+                            </p:stCondLst>
+                            <p:childTnLst>
+                              <p:par>
+                                <p:cTn id="5" presetID="1" presetClass="entr" presetSubtype="0" fill="hold" grpId="0" nodeType="clickEffect">
+                                  <p:stCondLst>
+                                    <p:cond delay="0"/>
+                                  </p:stCondLst>
+                                  <p:childTnLst>
+                                    <p:set>
+                                      <p:cBhvr>
+                                        <p:cTn id="6" dur="1" fill="hold">
+                                          <p:stCondLst>
+                                            <p:cond delay="0"/>
+                                          </p:stCondLst>
+                                        </p:cTn>
+                                        <p:tgtEl>
+                                          <p:spTgt spid="3">
+                                            <p:txEl>
+                                              <p:pRg st="0" end="0"/>
+                                            </p:txEl>
+                                          </p:spTgt>
+                                        </p:tgtEl>
+                                        <p:attrNameLst>
+                                          <p:attrName>style.visibility</p:attrName>
+                                        </p:attrNameLst>
+                                      </p:cBhvr>
+                                      <p:to>
+                                        <p:strVal val="visible"/>
+                                      </p:to>
+                                    </p:set>
+                                  </p:childTnLst>
+                                </p:cTn>
+                              </p:par>
+                            </p:childTnLst>
+                          </p:cTn>
+                        </p:par>
+                      </p:childTnLst>
+                    </p:cTn>
+                  </p:par>
+                  <p:par>
+                    <p:cTn id="7" fill="hold">
+                      <p:stCondLst>
+                        <p:cond delay="indefinite"/>
+                      </p:stCondLst>
+                      <p:childTnLst>
+                        <p:par>
+                          <p:cTn id="8" fill="hold">
+                            <p:stCondLst>
+                              <p:cond delay="0"/>
+                            </p:stCondLst>
+                            <p:childTnLst>
+                              <p:par>
+                                <p:cTn id="9" presetID="1" presetClass="entr" presetSubtype="0" fill="hold" grpId="0" nodeType="clickEffect">
+                                  <p:stCondLst>
+                                    <p:cond delay="0"/>
+                                  </p:stCondLst>
+                                  <p:childTnLst>
+                                    <p:set>
+                                      <p:cBhvr>
+                                        <p:cTn id="10" dur="1" fill="hold">
+                                          <p:stCondLst>
+                                            <p:cond delay="0"/>
+                                          </p:stCondLst>
+                                        </p:cTn>
+                                        <p:tgtEl>
+                                          <p:spTgt spid="3">
+                                            <p:txEl>
+                                              <p:pRg st="1" end="1"/>
+                                            </p:txEl>
+                                          </p:spTgt>
+                                        </p:tgtEl>
+                                        <p:attrNameLst>
+                                          <p:attrName>style.visibility</p:attrName>
+                                        </p:attrNameLst>
+                                      </p:cBhvr>
+                                      <p:to>
+                                        <p:strVal val="visible"/>
+                                      </p:to>
+                                    </p:set>
+                                  </p:childTnLst>
+                                </p:cTn>
+                              </p:par>
+                              <p:par>
+                                <p:cTn id="11" presetID="1" presetClass="entr" presetSubtype="0" fill="hold" grpId="0" nodeType="withEffect">
+                                  <p:stCondLst>
+                                    <p:cond delay="0"/>
+                                  </p:stCondLst>
+                                  <p:childTnLst>
+                                    <p:set>
+                                      <p:cBhvr>
+                                        <p:cTn id="12" dur="1" fill="hold">
+                                          <p:stCondLst>
+                                            <p:cond delay="0"/>
+                                          </p:stCondLst>
+                                        </p:cTn>
+                                        <p:tgtEl>
+                                          <p:spTgt spid="3">
+                                            <p:txEl>
+                                              <p:pRg st="2" end="2"/>
+                                            </p:txEl>
+                                          </p:spTgt>
+                                        </p:tgtEl>
+                                        <p:attrNameLst>
+                                          <p:attrName>style.visibility</p:attrName>
+                                        </p:attrNameLst>
+                                      </p:cBhvr>
+                                      <p:to>
+                                        <p:strVal val="visible"/>
+                                      </p:to>
+                                    </p:set>
+                                  </p:childTnLst>
+                                </p:cTn>
+                              </p:par>
+                              <p:par>
+                                <p:cTn id="13" presetID="1" presetClass="entr" presetSubtype="0" fill="hold" grpId="0" nodeType="withEffect">
+                                  <p:stCondLst>
+                                    <p:cond delay="0"/>
+                                  </p:stCondLst>
+                                  <p:childTnLst>
+                                    <p:set>
+                                      <p:cBhvr>
+                                        <p:cTn id="14" dur="1" fill="hold">
+                                          <p:stCondLst>
+                                            <p:cond delay="0"/>
+                                          </p:stCondLst>
+                                        </p:cTn>
+                                        <p:tgtEl>
+                                          <p:spTgt spid="3">
+                                            <p:txEl>
+                                              <p:pRg st="3" end="3"/>
+                                            </p:txEl>
+                                          </p:spTgt>
+                                        </p:tgtEl>
+                                        <p:attrNameLst>
+                                          <p:attrName>style.visibility</p:attrName>
+                                        </p:attrNameLst>
+                                      </p:cBhvr>
+                                      <p:to>
+                                        <p:strVal val="visible"/>
+                                      </p:to>
+                                    </p:set>
+                                  </p:childTnLst>
+                                </p:cTn>
+                              </p:par>
+                              <p:par>
+                                <p:cTn id="15" presetID="1" presetClass="entr" presetSubtype="0" fill="hold" grpId="0" nodeType="withEffect">
+                                  <p:stCondLst>
+                                    <p:cond delay="0"/>
+                                  </p:stCondLst>
+                                  <p:childTnLst>
+                                    <p:set>
+                                      <p:cBhvr>
+                                        <p:cTn id="16" dur="1" fill="hold">
+                                          <p:stCondLst>
+                                            <p:cond delay="0"/>
+                                          </p:stCondLst>
+                                        </p:cTn>
+                                        <p:tgtEl>
+                                          <p:spTgt spid="3">
+                                            <p:txEl>
+                                              <p:pRg st="4" end="4"/>
+                                            </p:txEl>
+                                          </p:spTgt>
+                                        </p:tgtEl>
+                                        <p:attrNameLst>
+                                          <p:attrName>style.visibility</p:attrName>
+                                        </p:attrNameLst>
+                                      </p:cBhvr>
+                                      <p:to>
+                                        <p:strVal val="visible"/>
+                                      </p:to>
+                                    </p:set>
+                                  </p:childTnLst>
+                                </p:cTn>
+                              </p:par>
+                            </p:childTnLst>
+                          </p:cTn>
+                        </p:par>
+                      </p:childTnLst>
+                    </p:cTn>
+                  </p:par>
+                  <p:par>
+                    <p:cTn id="17" fill="hold">
+                      <p:stCondLst>
+                        <p:cond delay="indefinite"/>
+                      </p:stCondLst>
+                      <p:childTnLst>
+                        <p:par>
+                          <p:cTn id="18" fill="hold">
+                            <p:stCondLst>
+                              <p:cond delay="0"/>
+                            </p:stCondLst>
+                            <p:childTnLst>
+                              <p:par>
+                                <p:cTn id="19" presetID="1" presetClass="entr" presetSubtype="0" fill="hold" grpId="0" nodeType="clickEffect">
+                                  <p:stCondLst>
+                                    <p:cond delay="0"/>
+                                  </p:stCondLst>
+                                  <p:childTnLst>
+                                    <p:set>
+                                      <p:cBhvr>
+                                        <p:cTn id="20" dur="1" fill="hold">
+                                          <p:stCondLst>
+                                            <p:cond delay="0"/>
+                                          </p:stCondLst>
+                                        </p:cTn>
+                                        <p:tgtEl>
+                                          <p:spTgt spid="3">
+                                            <p:txEl>
+                                              <p:pRg st="5" end="5"/>
+                                            </p:txEl>
+                                          </p:spTgt>
+                                        </p:tgtEl>
+                                        <p:attrNameLst>
+                                          <p:attrName>style.visibility</p:attrName>
+                                        </p:attrNameLst>
+                                      </p:cBhvr>
+                                      <p:to>
+                                        <p:strVal val="visible"/>
+                                      </p:to>
+                                    </p:set>
+                                  </p:childTnLst>
+                                </p:cTn>
+                              </p:par>
+                            </p:childTnLst>
+                          </p:cTn>
+                        </p:par>
+                      </p:childTnLst>
+                    </p:cTn>
+                  </p:par>
+                  <p:par>
+                    <p:cTn id="21" fill="hold">
+                      <p:stCondLst>
+                        <p:cond delay="indefinite"/>
+                      </p:stCondLst>
+                      <p:childTnLst>
+                        <p:par>
+                          <p:cTn id="22" fill="hold">
+                            <p:stCondLst>
+                              <p:cond delay="0"/>
+                            </p:stCondLst>
+                            <p:childTnLst>
+                              <p:par>
+                                <p:cTn id="23" presetID="1" presetClass="entr" presetSubtype="0" fill="hold" grpId="0" nodeType="clickEffect">
+                                  <p:stCondLst>
+                                    <p:cond delay="0"/>
+                                  </p:stCondLst>
+                                  <p:childTnLst>
+                                    <p:set>
+                                      <p:cBhvr>
+                                        <p:cTn id="24" dur="1" fill="hold">
+                                          <p:stCondLst>
+                                            <p:cond delay="0"/>
+                                          </p:stCondLst>
+                                        </p:cTn>
+                                        <p:tgtEl>
+                                          <p:spTgt spid="3">
+                                            <p:txEl>
+                                              <p:pRg st="6" end="6"/>
+                                            </p:txEl>
+                                          </p:spTgt>
+                                        </p:tgtEl>
+                                        <p:attrNameLst>
+                                          <p:attrName>style.visibility</p:attrName>
+                                        </p:attrNameLst>
+                                      </p:cBhvr>
+                                      <p:to>
+                                        <p:strVal val="visible"/>
+                                      </p:to>
+                                    </p:set>
+                                  </p:childTnLst>
+                                </p:cTn>
+                              </p:par>
+                            </p:childTnLst>
+                          </p:cTn>
+                        </p:par>
+                      </p:childTnLst>
+                    </p:cTn>
+                  </p:par>
+                  <p:par>
+                    <p:cTn id="25" fill="hold">
+                      <p:stCondLst>
+                        <p:cond delay="indefinite"/>
+                      </p:stCondLst>
+                      <p:childTnLst>
+                        <p:par>
+                          <p:cTn id="26" fill="hold">
+                            <p:stCondLst>
+                              <p:cond delay="0"/>
+                            </p:stCondLst>
+                            <p:childTnLst>
+                              <p:par>
+                                <p:cTn id="27" presetID="1" presetClass="entr" presetSubtype="0" fill="hold" grpId="0" nodeType="clickEffect">
+                                  <p:stCondLst>
+                                    <p:cond delay="0"/>
+                                  </p:stCondLst>
+                                  <p:childTnLst>
+                                    <p:set>
+                                      <p:cBhvr>
+                                        <p:cTn id="28" dur="1" fill="hold">
+                                          <p:stCondLst>
+                                            <p:cond delay="0"/>
+                                          </p:stCondLst>
+                                        </p:cTn>
+                                        <p:tgtEl>
+                                          <p:spTgt spid="3">
+                                            <p:txEl>
+                                              <p:pRg st="7" end="7"/>
+                                            </p:txEl>
+                                          </p:spTgt>
+                                        </p:tgtEl>
+                                        <p:attrNameLst>
+                                          <p:attrName>style.visibility</p:attrName>
+                                        </p:attrNameLst>
+                                      </p:cBhvr>
+                                      <p:to>
+                                        <p:strVal val="visible"/>
+                                      </p:to>
+                                    </p:set>
+                                  </p:childTnLst>
+                                </p:cTn>
+                              </p:par>
+                            </p:childTnLst>
+                          </p:cTn>
+                        </p:par>
+                      </p:childTnLst>
+                    </p:cTn>
+                  </p:par>
+                </p:childTnLst>
+              </p:cTn>
+              <p:prevCondLst>
+                <p:cond evt="onPrev" delay="0">
+                  <p:tgtEl>
+                    <p:sldTgt/>
+                  </p:tgtEl>
+                </p:cond>
+              </p:prevCondLst>
+              <p:nextCondLst>
+                <p:cond evt="onNext" delay="0">
+                  <p:tgtEl>
+                    <p:sldTgt/>
+                  </p:tgtEl>
+                </p:cond>
+              </p:nextCondLst>
+            </p:seq>
+          </p:childTnLst>
+        </p:cTn>
+      </p:par>
+    </p:tnLst>
+    <p:bldLst>
+      <p:bldP spid="3" grpId="0" build="p"/>
+    </p:bldLst>
+  </p:timing>
 </p:sld>
 </file>
 
@@ -10110,7 +10897,7 @@
           <p:nvPr/>
         </p:nvPicPr>
         <p:blipFill>
-          <a:blip r:embed="rId2"/>
+          <a:blip r:embed="rId3"/>
           <a:stretch>
             <a:fillRect/>
           </a:stretch>
@@ -10215,13 +11002,6 @@
             <a:pPr lvl="2"/>
             <a:r>
               <a:rPr lang="en-US" sz="1800" dirty="0"/>
-              <a:t>Our data flow is efficient because it gets all data with only 1 API request / WDI</a:t>
-            </a:r>
-          </a:p>
-          <a:p>
-            <a:pPr lvl="2"/>
-            <a:r>
-              <a:rPr lang="en-US" sz="1800" dirty="0"/>
               <a:t>Use loop construction, conditional branching and list to table transformation)</a:t>
             </a:r>
           </a:p>
@@ -10256,6 +11036,297 @@
   <p:clrMapOvr>
     <a:masterClrMapping/>
   </p:clrMapOvr>
+  <p:timing>
+    <p:tnLst>
+      <p:par>
+        <p:cTn id="1" dur="indefinite" restart="never" nodeType="tmRoot">
+          <p:childTnLst>
+            <p:seq concurrent="1" nextAc="seek">
+              <p:cTn id="2" dur="indefinite" nodeType="mainSeq">
+                <p:childTnLst>
+                  <p:par>
+                    <p:cTn id="3" fill="hold">
+                      <p:stCondLst>
+                        <p:cond delay="indefinite"/>
+                      </p:stCondLst>
+                      <p:childTnLst>
+                        <p:par>
+                          <p:cTn id="4" fill="hold">
+                            <p:stCondLst>
+                              <p:cond delay="0"/>
+                            </p:stCondLst>
+                            <p:childTnLst>
+                              <p:par>
+                                <p:cTn id="5" presetID="1" presetClass="entr" presetSubtype="0" fill="hold" grpId="0" nodeType="clickEffect">
+                                  <p:stCondLst>
+                                    <p:cond delay="0"/>
+                                  </p:stCondLst>
+                                  <p:childTnLst>
+                                    <p:set>
+                                      <p:cBhvr>
+                                        <p:cTn id="6" dur="1" fill="hold">
+                                          <p:stCondLst>
+                                            <p:cond delay="0"/>
+                                          </p:stCondLst>
+                                        </p:cTn>
+                                        <p:tgtEl>
+                                          <p:spTgt spid="29">
+                                            <p:txEl>
+                                              <p:pRg st="0" end="0"/>
+                                            </p:txEl>
+                                          </p:spTgt>
+                                        </p:tgtEl>
+                                        <p:attrNameLst>
+                                          <p:attrName>style.visibility</p:attrName>
+                                        </p:attrNameLst>
+                                      </p:cBhvr>
+                                      <p:to>
+                                        <p:strVal val="visible"/>
+                                      </p:to>
+                                    </p:set>
+                                  </p:childTnLst>
+                                </p:cTn>
+                              </p:par>
+                            </p:childTnLst>
+                          </p:cTn>
+                        </p:par>
+                      </p:childTnLst>
+                    </p:cTn>
+                  </p:par>
+                  <p:par>
+                    <p:cTn id="7" fill="hold">
+                      <p:stCondLst>
+                        <p:cond delay="indefinite"/>
+                      </p:stCondLst>
+                      <p:childTnLst>
+                        <p:par>
+                          <p:cTn id="8" fill="hold">
+                            <p:stCondLst>
+                              <p:cond delay="0"/>
+                            </p:stCondLst>
+                            <p:childTnLst>
+                              <p:par>
+                                <p:cTn id="9" presetID="1" presetClass="entr" presetSubtype="0" fill="hold" grpId="0" nodeType="clickEffect">
+                                  <p:stCondLst>
+                                    <p:cond delay="0"/>
+                                  </p:stCondLst>
+                                  <p:childTnLst>
+                                    <p:set>
+                                      <p:cBhvr>
+                                        <p:cTn id="10" dur="1" fill="hold">
+                                          <p:stCondLst>
+                                            <p:cond delay="0"/>
+                                          </p:stCondLst>
+                                        </p:cTn>
+                                        <p:tgtEl>
+                                          <p:spTgt spid="29">
+                                            <p:txEl>
+                                              <p:pRg st="1" end="1"/>
+                                            </p:txEl>
+                                          </p:spTgt>
+                                        </p:tgtEl>
+                                        <p:attrNameLst>
+                                          <p:attrName>style.visibility</p:attrName>
+                                        </p:attrNameLst>
+                                      </p:cBhvr>
+                                      <p:to>
+                                        <p:strVal val="visible"/>
+                                      </p:to>
+                                    </p:set>
+                                  </p:childTnLst>
+                                </p:cTn>
+                              </p:par>
+                            </p:childTnLst>
+                          </p:cTn>
+                        </p:par>
+                      </p:childTnLst>
+                    </p:cTn>
+                  </p:par>
+                  <p:par>
+                    <p:cTn id="11" fill="hold">
+                      <p:stCondLst>
+                        <p:cond delay="indefinite"/>
+                      </p:stCondLst>
+                      <p:childTnLst>
+                        <p:par>
+                          <p:cTn id="12" fill="hold">
+                            <p:stCondLst>
+                              <p:cond delay="0"/>
+                            </p:stCondLst>
+                            <p:childTnLst>
+                              <p:par>
+                                <p:cTn id="13" presetID="1" presetClass="entr" presetSubtype="0" fill="hold" grpId="0" nodeType="clickEffect">
+                                  <p:stCondLst>
+                                    <p:cond delay="0"/>
+                                  </p:stCondLst>
+                                  <p:childTnLst>
+                                    <p:set>
+                                      <p:cBhvr>
+                                        <p:cTn id="14" dur="1" fill="hold">
+                                          <p:stCondLst>
+                                            <p:cond delay="0"/>
+                                          </p:stCondLst>
+                                        </p:cTn>
+                                        <p:tgtEl>
+                                          <p:spTgt spid="29">
+                                            <p:txEl>
+                                              <p:pRg st="2" end="2"/>
+                                            </p:txEl>
+                                          </p:spTgt>
+                                        </p:tgtEl>
+                                        <p:attrNameLst>
+                                          <p:attrName>style.visibility</p:attrName>
+                                        </p:attrNameLst>
+                                      </p:cBhvr>
+                                      <p:to>
+                                        <p:strVal val="visible"/>
+                                      </p:to>
+                                    </p:set>
+                                  </p:childTnLst>
+                                </p:cTn>
+                              </p:par>
+                            </p:childTnLst>
+                          </p:cTn>
+                        </p:par>
+                      </p:childTnLst>
+                    </p:cTn>
+                  </p:par>
+                  <p:par>
+                    <p:cTn id="15" fill="hold">
+                      <p:stCondLst>
+                        <p:cond delay="indefinite"/>
+                      </p:stCondLst>
+                      <p:childTnLst>
+                        <p:par>
+                          <p:cTn id="16" fill="hold">
+                            <p:stCondLst>
+                              <p:cond delay="0"/>
+                            </p:stCondLst>
+                            <p:childTnLst>
+                              <p:par>
+                                <p:cTn id="17" presetID="1" presetClass="entr" presetSubtype="0" fill="hold" grpId="0" nodeType="clickEffect">
+                                  <p:stCondLst>
+                                    <p:cond delay="0"/>
+                                  </p:stCondLst>
+                                  <p:childTnLst>
+                                    <p:set>
+                                      <p:cBhvr>
+                                        <p:cTn id="18" dur="1" fill="hold">
+                                          <p:stCondLst>
+                                            <p:cond delay="0"/>
+                                          </p:stCondLst>
+                                        </p:cTn>
+                                        <p:tgtEl>
+                                          <p:spTgt spid="29">
+                                            <p:txEl>
+                                              <p:pRg st="3" end="3"/>
+                                            </p:txEl>
+                                          </p:spTgt>
+                                        </p:tgtEl>
+                                        <p:attrNameLst>
+                                          <p:attrName>style.visibility</p:attrName>
+                                        </p:attrNameLst>
+                                      </p:cBhvr>
+                                      <p:to>
+                                        <p:strVal val="visible"/>
+                                      </p:to>
+                                    </p:set>
+                                  </p:childTnLst>
+                                </p:cTn>
+                              </p:par>
+                              <p:par>
+                                <p:cTn id="19" presetID="1" presetClass="entr" presetSubtype="0" fill="hold" grpId="0" nodeType="withEffect">
+                                  <p:stCondLst>
+                                    <p:cond delay="0"/>
+                                  </p:stCondLst>
+                                  <p:childTnLst>
+                                    <p:set>
+                                      <p:cBhvr>
+                                        <p:cTn id="20" dur="1" fill="hold">
+                                          <p:stCondLst>
+                                            <p:cond delay="0"/>
+                                          </p:stCondLst>
+                                        </p:cTn>
+                                        <p:tgtEl>
+                                          <p:spTgt spid="29">
+                                            <p:txEl>
+                                              <p:pRg st="4" end="4"/>
+                                            </p:txEl>
+                                          </p:spTgt>
+                                        </p:tgtEl>
+                                        <p:attrNameLst>
+                                          <p:attrName>style.visibility</p:attrName>
+                                        </p:attrNameLst>
+                                      </p:cBhvr>
+                                      <p:to>
+                                        <p:strVal val="visible"/>
+                                      </p:to>
+                                    </p:set>
+                                  </p:childTnLst>
+                                </p:cTn>
+                              </p:par>
+                              <p:par>
+                                <p:cTn id="21" presetID="1" presetClass="entr" presetSubtype="0" fill="hold" grpId="0" nodeType="withEffect">
+                                  <p:stCondLst>
+                                    <p:cond delay="0"/>
+                                  </p:stCondLst>
+                                  <p:childTnLst>
+                                    <p:set>
+                                      <p:cBhvr>
+                                        <p:cTn id="22" dur="1" fill="hold">
+                                          <p:stCondLst>
+                                            <p:cond delay="0"/>
+                                          </p:stCondLst>
+                                        </p:cTn>
+                                        <p:tgtEl>
+                                          <p:spTgt spid="29">
+                                            <p:txEl>
+                                              <p:pRg st="5" end="5"/>
+                                            </p:txEl>
+                                          </p:spTgt>
+                                        </p:tgtEl>
+                                        <p:attrNameLst>
+                                          <p:attrName>style.visibility</p:attrName>
+                                        </p:attrNameLst>
+                                      </p:cBhvr>
+                                      <p:to>
+                                        <p:strVal val="visible"/>
+                                      </p:to>
+                                    </p:set>
+                                  </p:childTnLst>
+                                </p:cTn>
+                              </p:par>
+                            </p:childTnLst>
+                          </p:cTn>
+                        </p:par>
+                      </p:childTnLst>
+                    </p:cTn>
+                  </p:par>
+                </p:childTnLst>
+              </p:cTn>
+              <p:prevCondLst>
+                <p:cond evt="onPrev" delay="0">
+                  <p:tgtEl>
+                    <p:sldTgt/>
+                  </p:tgtEl>
+                </p:cond>
+              </p:prevCondLst>
+              <p:nextCondLst>
+                <p:cond evt="onNext" delay="0">
+                  <p:tgtEl>
+                    <p:sldTgt/>
+                  </p:tgtEl>
+                </p:cond>
+              </p:nextCondLst>
+            </p:seq>
+          </p:childTnLst>
+        </p:cTn>
+      </p:par>
+    </p:tnLst>
+    <p:bldLst>
+      <p:bldP spid="29" grpId="0" build="p"/>
+    </p:bldLst>
+  </p:timing>
 </p:sld>
 </file>
 
@@ -10777,6 +11848,199 @@
   <p:clrMapOvr>
     <a:masterClrMapping/>
   </p:clrMapOvr>
+  <p:timing>
+    <p:tnLst>
+      <p:par>
+        <p:cTn id="1" dur="indefinite" restart="never" nodeType="tmRoot">
+          <p:childTnLst>
+            <p:seq concurrent="1" nextAc="seek">
+              <p:cTn id="2" dur="indefinite" nodeType="mainSeq">
+                <p:childTnLst>
+                  <p:par>
+                    <p:cTn id="3" fill="hold">
+                      <p:stCondLst>
+                        <p:cond delay="indefinite"/>
+                      </p:stCondLst>
+                      <p:childTnLst>
+                        <p:par>
+                          <p:cTn id="4" fill="hold">
+                            <p:stCondLst>
+                              <p:cond delay="0"/>
+                            </p:stCondLst>
+                            <p:childTnLst>
+                              <p:par>
+                                <p:cTn id="5" presetID="1" presetClass="entr" presetSubtype="0" fill="hold" grpId="0" nodeType="clickEffect">
+                                  <p:stCondLst>
+                                    <p:cond delay="0"/>
+                                  </p:stCondLst>
+                                  <p:childTnLst>
+                                    <p:set>
+                                      <p:cBhvr>
+                                        <p:cTn id="6" dur="1" fill="hold">
+                                          <p:stCondLst>
+                                            <p:cond delay="0"/>
+                                          </p:stCondLst>
+                                        </p:cTn>
+                                        <p:tgtEl>
+                                          <p:spTgt spid="3">
+                                            <p:txEl>
+                                              <p:pRg st="0" end="0"/>
+                                            </p:txEl>
+                                          </p:spTgt>
+                                        </p:tgtEl>
+                                        <p:attrNameLst>
+                                          <p:attrName>style.visibility</p:attrName>
+                                        </p:attrNameLst>
+                                      </p:cBhvr>
+                                      <p:to>
+                                        <p:strVal val="visible"/>
+                                      </p:to>
+                                    </p:set>
+                                  </p:childTnLst>
+                                </p:cTn>
+                              </p:par>
+                            </p:childTnLst>
+                          </p:cTn>
+                        </p:par>
+                      </p:childTnLst>
+                    </p:cTn>
+                  </p:par>
+                  <p:par>
+                    <p:cTn id="7" fill="hold">
+                      <p:stCondLst>
+                        <p:cond delay="indefinite"/>
+                      </p:stCondLst>
+                      <p:childTnLst>
+                        <p:par>
+                          <p:cTn id="8" fill="hold">
+                            <p:stCondLst>
+                              <p:cond delay="0"/>
+                            </p:stCondLst>
+                            <p:childTnLst>
+                              <p:par>
+                                <p:cTn id="9" presetID="1" presetClass="entr" presetSubtype="0" fill="hold" grpId="0" nodeType="clickEffect">
+                                  <p:stCondLst>
+                                    <p:cond delay="0"/>
+                                  </p:stCondLst>
+                                  <p:childTnLst>
+                                    <p:set>
+                                      <p:cBhvr>
+                                        <p:cTn id="10" dur="1" fill="hold">
+                                          <p:stCondLst>
+                                            <p:cond delay="0"/>
+                                          </p:stCondLst>
+                                        </p:cTn>
+                                        <p:tgtEl>
+                                          <p:spTgt spid="3">
+                                            <p:txEl>
+                                              <p:pRg st="1" end="1"/>
+                                            </p:txEl>
+                                          </p:spTgt>
+                                        </p:tgtEl>
+                                        <p:attrNameLst>
+                                          <p:attrName>style.visibility</p:attrName>
+                                        </p:attrNameLst>
+                                      </p:cBhvr>
+                                      <p:to>
+                                        <p:strVal val="visible"/>
+                                      </p:to>
+                                    </p:set>
+                                  </p:childTnLst>
+                                </p:cTn>
+                              </p:par>
+                              <p:par>
+                                <p:cTn id="11" presetID="1" presetClass="entr" presetSubtype="0" fill="hold" grpId="0" nodeType="withEffect">
+                                  <p:stCondLst>
+                                    <p:cond delay="0"/>
+                                  </p:stCondLst>
+                                  <p:childTnLst>
+                                    <p:set>
+                                      <p:cBhvr>
+                                        <p:cTn id="12" dur="1" fill="hold">
+                                          <p:stCondLst>
+                                            <p:cond delay="0"/>
+                                          </p:stCondLst>
+                                        </p:cTn>
+                                        <p:tgtEl>
+                                          <p:spTgt spid="3">
+                                            <p:txEl>
+                                              <p:pRg st="2" end="2"/>
+                                            </p:txEl>
+                                          </p:spTgt>
+                                        </p:tgtEl>
+                                        <p:attrNameLst>
+                                          <p:attrName>style.visibility</p:attrName>
+                                        </p:attrNameLst>
+                                      </p:cBhvr>
+                                      <p:to>
+                                        <p:strVal val="visible"/>
+                                      </p:to>
+                                    </p:set>
+                                  </p:childTnLst>
+                                </p:cTn>
+                              </p:par>
+                              <p:par>
+                                <p:cTn id="13" presetID="1" presetClass="entr" presetSubtype="0" fill="hold" grpId="0" nodeType="withEffect">
+                                  <p:stCondLst>
+                                    <p:cond delay="0"/>
+                                  </p:stCondLst>
+                                  <p:childTnLst>
+                                    <p:set>
+                                      <p:cBhvr>
+                                        <p:cTn id="14" dur="1" fill="hold">
+                                          <p:stCondLst>
+                                            <p:cond delay="0"/>
+                                          </p:stCondLst>
+                                        </p:cTn>
+                                        <p:tgtEl>
+                                          <p:spTgt spid="3">
+                                            <p:txEl>
+                                              <p:pRg st="3" end="3"/>
+                                            </p:txEl>
+                                          </p:spTgt>
+                                        </p:tgtEl>
+                                        <p:attrNameLst>
+                                          <p:attrName>style.visibility</p:attrName>
+                                        </p:attrNameLst>
+                                      </p:cBhvr>
+                                      <p:to>
+                                        <p:strVal val="visible"/>
+                                      </p:to>
+                                    </p:set>
+                                  </p:childTnLst>
+                                </p:cTn>
+                              </p:par>
+                            </p:childTnLst>
+                          </p:cTn>
+                        </p:par>
+                      </p:childTnLst>
+                    </p:cTn>
+                  </p:par>
+                </p:childTnLst>
+              </p:cTn>
+              <p:prevCondLst>
+                <p:cond evt="onPrev" delay="0">
+                  <p:tgtEl>
+                    <p:sldTgt/>
+                  </p:tgtEl>
+                </p:cond>
+              </p:prevCondLst>
+              <p:nextCondLst>
+                <p:cond evt="onNext" delay="0">
+                  <p:tgtEl>
+                    <p:sldTgt/>
+                  </p:tgtEl>
+                </p:cond>
+              </p:nextCondLst>
+            </p:seq>
+          </p:childTnLst>
+        </p:cTn>
+      </p:par>
+    </p:tnLst>
+    <p:bldLst>
+      <p:bldP spid="3" grpId="0" build="p"/>
+    </p:bldLst>
+  </p:timing>
 </p:sld>
 </file>
 
@@ -11598,6 +12862,284 @@
   <p:clrMapOvr>
     <a:masterClrMapping/>
   </p:clrMapOvr>
+  <p:timing>
+    <p:tnLst>
+      <p:par>
+        <p:cTn id="1" dur="indefinite" restart="never" nodeType="tmRoot">
+          <p:childTnLst>
+            <p:seq concurrent="1" nextAc="seek">
+              <p:cTn id="2" dur="indefinite" nodeType="mainSeq">
+                <p:childTnLst>
+                  <p:par>
+                    <p:cTn id="3" fill="hold">
+                      <p:stCondLst>
+                        <p:cond delay="indefinite"/>
+                      </p:stCondLst>
+                      <p:childTnLst>
+                        <p:par>
+                          <p:cTn id="4" fill="hold">
+                            <p:stCondLst>
+                              <p:cond delay="0"/>
+                            </p:stCondLst>
+                            <p:childTnLst>
+                              <p:par>
+                                <p:cTn id="5" presetID="1" presetClass="entr" presetSubtype="0" fill="hold" grpId="0" nodeType="clickEffect">
+                                  <p:stCondLst>
+                                    <p:cond delay="0"/>
+                                  </p:stCondLst>
+                                  <p:childTnLst>
+                                    <p:set>
+                                      <p:cBhvr>
+                                        <p:cTn id="6" dur="1" fill="hold">
+                                          <p:stCondLst>
+                                            <p:cond delay="0"/>
+                                          </p:stCondLst>
+                                        </p:cTn>
+                                        <p:tgtEl>
+                                          <p:spTgt spid="5">
+                                            <p:txEl>
+                                              <p:pRg st="1" end="1"/>
+                                            </p:txEl>
+                                          </p:spTgt>
+                                        </p:tgtEl>
+                                        <p:attrNameLst>
+                                          <p:attrName>style.visibility</p:attrName>
+                                        </p:attrNameLst>
+                                      </p:cBhvr>
+                                      <p:to>
+                                        <p:strVal val="visible"/>
+                                      </p:to>
+                                    </p:set>
+                                  </p:childTnLst>
+                                </p:cTn>
+                              </p:par>
+                            </p:childTnLst>
+                          </p:cTn>
+                        </p:par>
+                      </p:childTnLst>
+                    </p:cTn>
+                  </p:par>
+                  <p:par>
+                    <p:cTn id="7" fill="hold">
+                      <p:stCondLst>
+                        <p:cond delay="indefinite"/>
+                      </p:stCondLst>
+                      <p:childTnLst>
+                        <p:par>
+                          <p:cTn id="8" fill="hold">
+                            <p:stCondLst>
+                              <p:cond delay="0"/>
+                            </p:stCondLst>
+                            <p:childTnLst>
+                              <p:par>
+                                <p:cTn id="9" presetID="1" presetClass="entr" presetSubtype="0" fill="hold" grpId="0" nodeType="clickEffect">
+                                  <p:stCondLst>
+                                    <p:cond delay="0"/>
+                                  </p:stCondLst>
+                                  <p:childTnLst>
+                                    <p:set>
+                                      <p:cBhvr>
+                                        <p:cTn id="10" dur="1" fill="hold">
+                                          <p:stCondLst>
+                                            <p:cond delay="0"/>
+                                          </p:stCondLst>
+                                        </p:cTn>
+                                        <p:tgtEl>
+                                          <p:spTgt spid="5">
+                                            <p:txEl>
+                                              <p:pRg st="2" end="2"/>
+                                            </p:txEl>
+                                          </p:spTgt>
+                                        </p:tgtEl>
+                                        <p:attrNameLst>
+                                          <p:attrName>style.visibility</p:attrName>
+                                        </p:attrNameLst>
+                                      </p:cBhvr>
+                                      <p:to>
+                                        <p:strVal val="visible"/>
+                                      </p:to>
+                                    </p:set>
+                                  </p:childTnLst>
+                                </p:cTn>
+                              </p:par>
+                            </p:childTnLst>
+                          </p:cTn>
+                        </p:par>
+                      </p:childTnLst>
+                    </p:cTn>
+                  </p:par>
+                  <p:par>
+                    <p:cTn id="11" fill="hold">
+                      <p:stCondLst>
+                        <p:cond delay="indefinite"/>
+                      </p:stCondLst>
+                      <p:childTnLst>
+                        <p:par>
+                          <p:cTn id="12" fill="hold">
+                            <p:stCondLst>
+                              <p:cond delay="0"/>
+                            </p:stCondLst>
+                            <p:childTnLst>
+                              <p:par>
+                                <p:cTn id="13" presetID="1" presetClass="entr" presetSubtype="0" fill="hold" grpId="0" nodeType="clickEffect">
+                                  <p:stCondLst>
+                                    <p:cond delay="0"/>
+                                  </p:stCondLst>
+                                  <p:childTnLst>
+                                    <p:set>
+                                      <p:cBhvr>
+                                        <p:cTn id="14" dur="1" fill="hold">
+                                          <p:stCondLst>
+                                            <p:cond delay="0"/>
+                                          </p:stCondLst>
+                                        </p:cTn>
+                                        <p:tgtEl>
+                                          <p:spTgt spid="5">
+                                            <p:txEl>
+                                              <p:pRg st="3" end="3"/>
+                                            </p:txEl>
+                                          </p:spTgt>
+                                        </p:tgtEl>
+                                        <p:attrNameLst>
+                                          <p:attrName>style.visibility</p:attrName>
+                                        </p:attrNameLst>
+                                      </p:cBhvr>
+                                      <p:to>
+                                        <p:strVal val="visible"/>
+                                      </p:to>
+                                    </p:set>
+                                  </p:childTnLst>
+                                </p:cTn>
+                              </p:par>
+                            </p:childTnLst>
+                          </p:cTn>
+                        </p:par>
+                      </p:childTnLst>
+                    </p:cTn>
+                  </p:par>
+                  <p:par>
+                    <p:cTn id="15" fill="hold">
+                      <p:stCondLst>
+                        <p:cond delay="indefinite"/>
+                      </p:stCondLst>
+                      <p:childTnLst>
+                        <p:par>
+                          <p:cTn id="16" fill="hold">
+                            <p:stCondLst>
+                              <p:cond delay="0"/>
+                            </p:stCondLst>
+                            <p:childTnLst>
+                              <p:par>
+                                <p:cTn id="17" presetID="1" presetClass="entr" presetSubtype="0" fill="hold" grpId="0" nodeType="clickEffect">
+                                  <p:stCondLst>
+                                    <p:cond delay="0"/>
+                                  </p:stCondLst>
+                                  <p:childTnLst>
+                                    <p:set>
+                                      <p:cBhvr>
+                                        <p:cTn id="18" dur="1" fill="hold">
+                                          <p:stCondLst>
+                                            <p:cond delay="0"/>
+                                          </p:stCondLst>
+                                        </p:cTn>
+                                        <p:tgtEl>
+                                          <p:spTgt spid="5">
+                                            <p:txEl>
+                                              <p:pRg st="4" end="4"/>
+                                            </p:txEl>
+                                          </p:spTgt>
+                                        </p:tgtEl>
+                                        <p:attrNameLst>
+                                          <p:attrName>style.visibility</p:attrName>
+                                        </p:attrNameLst>
+                                      </p:cBhvr>
+                                      <p:to>
+                                        <p:strVal val="visible"/>
+                                      </p:to>
+                                    </p:set>
+                                  </p:childTnLst>
+                                </p:cTn>
+                              </p:par>
+                            </p:childTnLst>
+                          </p:cTn>
+                        </p:par>
+                      </p:childTnLst>
+                    </p:cTn>
+                  </p:par>
+                  <p:par>
+                    <p:cTn id="19" fill="hold">
+                      <p:stCondLst>
+                        <p:cond delay="indefinite"/>
+                      </p:stCondLst>
+                      <p:childTnLst>
+                        <p:par>
+                          <p:cTn id="20" fill="hold">
+                            <p:stCondLst>
+                              <p:cond delay="0"/>
+                            </p:stCondLst>
+                            <p:childTnLst>
+                              <p:par>
+                                <p:cTn id="21" presetID="1" presetClass="entr" presetSubtype="0" fill="hold" grpId="0" nodeType="clickEffect">
+                                  <p:stCondLst>
+                                    <p:cond delay="0"/>
+                                  </p:stCondLst>
+                                  <p:childTnLst>
+                                    <p:set>
+                                      <p:cBhvr>
+                                        <p:cTn id="22" dur="1" fill="hold">
+                                          <p:stCondLst>
+                                            <p:cond delay="0"/>
+                                          </p:stCondLst>
+                                        </p:cTn>
+                                        <p:tgtEl>
+                                          <p:spTgt spid="5">
+                                            <p:txEl>
+                                              <p:pRg st="5" end="5"/>
+                                            </p:txEl>
+                                          </p:spTgt>
+                                        </p:tgtEl>
+                                        <p:attrNameLst>
+                                          <p:attrName>style.visibility</p:attrName>
+                                        </p:attrNameLst>
+                                      </p:cBhvr>
+                                      <p:to>
+                                        <p:strVal val="visible"/>
+                                      </p:to>
+                                    </p:set>
+                                  </p:childTnLst>
+                                </p:cTn>
+                              </p:par>
+                            </p:childTnLst>
+                          </p:cTn>
+                        </p:par>
+                      </p:childTnLst>
+                    </p:cTn>
+                  </p:par>
+                </p:childTnLst>
+              </p:cTn>
+              <p:prevCondLst>
+                <p:cond evt="onPrev" delay="0">
+                  <p:tgtEl>
+                    <p:sldTgt/>
+                  </p:tgtEl>
+                </p:cond>
+              </p:prevCondLst>
+              <p:nextCondLst>
+                <p:cond evt="onNext" delay="0">
+                  <p:tgtEl>
+                    <p:sldTgt/>
+                  </p:tgtEl>
+                </p:cond>
+              </p:nextCondLst>
+            </p:seq>
+          </p:childTnLst>
+        </p:cTn>
+      </p:par>
+    </p:tnLst>
+    <p:bldLst>
+      <p:bldP spid="5" grpId="0" uiExpand="1" build="p"/>
+    </p:bldLst>
+  </p:timing>
 </p:sld>
 </file>
 

</xml_diff>